<commit_message>
Sql Sat Mcr Updates - Pre code
</commit_message>
<xml_diff>
--- a/Intro to Powershell - The history/Intro to PowerShell.pptx
+++ b/Intro to Powershell - The history/Intro to PowerShell.pptx
@@ -9,7 +9,7 @@
   </p:notesMasterIdLst>
   <p:sldIdLst>
     <p:sldId id="257" r:id="rId2"/>
-    <p:sldId id="258" r:id="rId3"/>
+    <p:sldId id="309" r:id="rId3"/>
     <p:sldId id="259" r:id="rId4"/>
     <p:sldId id="260" r:id="rId5"/>
     <p:sldId id="261" r:id="rId6"/>
@@ -226,7 +226,7 @@
           <a:p>
             <a:fld id="{8383EE63-874D-4763-B2DD-3E29373C9C81}" type="datetimeFigureOut">
               <a:rPr lang="en-GB" smtClean="0"/>
-              <a:t>24/11/2015</a:t>
+              <a:t>23/07/2016</a:t>
             </a:fld>
             <a:endParaRPr lang="en-GB"/>
           </a:p>
@@ -290,35 +290,35 @@
           <a:p>
             <a:pPr lvl="0"/>
             <a:r>
-              <a:rPr lang="en-US" smtClean="0"/>
+              <a:rPr lang="en-US"/>
               <a:t>Click to edit Master text styles</a:t>
             </a:r>
           </a:p>
           <a:p>
             <a:pPr lvl="1"/>
             <a:r>
-              <a:rPr lang="en-US" smtClean="0"/>
+              <a:rPr lang="en-US"/>
               <a:t>Second level</a:t>
             </a:r>
           </a:p>
           <a:p>
             <a:pPr lvl="2"/>
             <a:r>
-              <a:rPr lang="en-US" smtClean="0"/>
+              <a:rPr lang="en-US"/>
               <a:t>Third level</a:t>
             </a:r>
           </a:p>
           <a:p>
             <a:pPr lvl="3"/>
             <a:r>
-              <a:rPr lang="en-US" smtClean="0"/>
+              <a:rPr lang="en-US"/>
               <a:t>Fourth level</a:t>
             </a:r>
           </a:p>
           <a:p>
             <a:pPr lvl="4"/>
             <a:r>
-              <a:rPr lang="en-US" smtClean="0"/>
+              <a:rPr lang="en-US"/>
               <a:t>Fifth level</a:t>
             </a:r>
             <a:endParaRPr lang="en-GB"/>
@@ -1628,7 +1628,7 @@
           </a:lstStyle>
           <a:p>
             <a:r>
-              <a:rPr lang="en-US" smtClean="0"/>
+              <a:rPr lang="en-US"/>
               <a:t>Click to edit Master title style</a:t>
             </a:r>
             <a:endParaRPr lang="en-GB"/>
@@ -1693,7 +1693,7 @@
           </a:lstStyle>
           <a:p>
             <a:r>
-              <a:rPr lang="en-US" smtClean="0"/>
+              <a:rPr lang="en-US"/>
               <a:t>Click to edit Master subtitle style</a:t>
             </a:r>
             <a:endParaRPr lang="en-GB"/>
@@ -1717,7 +1717,7 @@
           <a:p>
             <a:fld id="{3C74E0FF-AD0F-4BA0-BE2E-166FF3A2BE35}" type="datetimeFigureOut">
               <a:rPr lang="en-GB" smtClean="0"/>
-              <a:t>24/11/2015</a:t>
+              <a:t>23/07/2016</a:t>
             </a:fld>
             <a:endParaRPr lang="en-GB"/>
           </a:p>
@@ -1811,7 +1811,7 @@
           <a:lstStyle/>
           <a:p>
             <a:r>
-              <a:rPr lang="en-US" smtClean="0"/>
+              <a:rPr lang="en-US"/>
               <a:t>Click to edit Master title style</a:t>
             </a:r>
             <a:endParaRPr lang="en-GB"/>
@@ -1835,35 +1835,35 @@
           <a:p>
             <a:pPr lvl="0"/>
             <a:r>
-              <a:rPr lang="en-US" smtClean="0"/>
+              <a:rPr lang="en-US"/>
               <a:t>Click to edit Master text styles</a:t>
             </a:r>
           </a:p>
           <a:p>
             <a:pPr lvl="1"/>
             <a:r>
-              <a:rPr lang="en-US" smtClean="0"/>
+              <a:rPr lang="en-US"/>
               <a:t>Second level</a:t>
             </a:r>
           </a:p>
           <a:p>
             <a:pPr lvl="2"/>
             <a:r>
-              <a:rPr lang="en-US" smtClean="0"/>
+              <a:rPr lang="en-US"/>
               <a:t>Third level</a:t>
             </a:r>
           </a:p>
           <a:p>
             <a:pPr lvl="3"/>
             <a:r>
-              <a:rPr lang="en-US" smtClean="0"/>
+              <a:rPr lang="en-US"/>
               <a:t>Fourth level</a:t>
             </a:r>
           </a:p>
           <a:p>
             <a:pPr lvl="4"/>
             <a:r>
-              <a:rPr lang="en-US" smtClean="0"/>
+              <a:rPr lang="en-US"/>
               <a:t>Fifth level</a:t>
             </a:r>
             <a:endParaRPr lang="en-GB"/>
@@ -1887,7 +1887,7 @@
           <a:p>
             <a:fld id="{3C74E0FF-AD0F-4BA0-BE2E-166FF3A2BE35}" type="datetimeFigureOut">
               <a:rPr lang="en-GB" smtClean="0"/>
-              <a:t>24/11/2015</a:t>
+              <a:t>23/07/2016</a:t>
             </a:fld>
             <a:endParaRPr lang="en-GB"/>
           </a:p>
@@ -1986,7 +1986,7 @@
           <a:lstStyle/>
           <a:p>
             <a:r>
-              <a:rPr lang="en-US" smtClean="0"/>
+              <a:rPr lang="en-US"/>
               <a:t>Click to edit Master title style</a:t>
             </a:r>
             <a:endParaRPr lang="en-GB"/>
@@ -2015,35 +2015,35 @@
           <a:p>
             <a:pPr lvl="0"/>
             <a:r>
-              <a:rPr lang="en-US" smtClean="0"/>
+              <a:rPr lang="en-US"/>
               <a:t>Click to edit Master text styles</a:t>
             </a:r>
           </a:p>
           <a:p>
             <a:pPr lvl="1"/>
             <a:r>
-              <a:rPr lang="en-US" smtClean="0"/>
+              <a:rPr lang="en-US"/>
               <a:t>Second level</a:t>
             </a:r>
           </a:p>
           <a:p>
             <a:pPr lvl="2"/>
             <a:r>
-              <a:rPr lang="en-US" smtClean="0"/>
+              <a:rPr lang="en-US"/>
               <a:t>Third level</a:t>
             </a:r>
           </a:p>
           <a:p>
             <a:pPr lvl="3"/>
             <a:r>
-              <a:rPr lang="en-US" smtClean="0"/>
+              <a:rPr lang="en-US"/>
               <a:t>Fourth level</a:t>
             </a:r>
           </a:p>
           <a:p>
             <a:pPr lvl="4"/>
             <a:r>
-              <a:rPr lang="en-US" smtClean="0"/>
+              <a:rPr lang="en-US"/>
               <a:t>Fifth level</a:t>
             </a:r>
             <a:endParaRPr lang="en-GB"/>
@@ -2067,7 +2067,7 @@
           <a:p>
             <a:fld id="{3C74E0FF-AD0F-4BA0-BE2E-166FF3A2BE35}" type="datetimeFigureOut">
               <a:rPr lang="en-GB" smtClean="0"/>
-              <a:t>24/11/2015</a:t>
+              <a:t>23/07/2016</a:t>
             </a:fld>
             <a:endParaRPr lang="en-GB"/>
           </a:p>
@@ -2161,7 +2161,7 @@
           <a:lstStyle/>
           <a:p>
             <a:r>
-              <a:rPr lang="en-US" smtClean="0"/>
+              <a:rPr lang="en-US"/>
               <a:t>Click to edit Master title style</a:t>
             </a:r>
             <a:endParaRPr lang="en-GB"/>
@@ -2185,35 +2185,35 @@
           <a:p>
             <a:pPr lvl="0"/>
             <a:r>
-              <a:rPr lang="en-US" smtClean="0"/>
+              <a:rPr lang="en-US"/>
               <a:t>Click to edit Master text styles</a:t>
             </a:r>
           </a:p>
           <a:p>
             <a:pPr lvl="1"/>
             <a:r>
-              <a:rPr lang="en-US" smtClean="0"/>
+              <a:rPr lang="en-US"/>
               <a:t>Second level</a:t>
             </a:r>
           </a:p>
           <a:p>
             <a:pPr lvl="2"/>
             <a:r>
-              <a:rPr lang="en-US" smtClean="0"/>
+              <a:rPr lang="en-US"/>
               <a:t>Third level</a:t>
             </a:r>
           </a:p>
           <a:p>
             <a:pPr lvl="3"/>
             <a:r>
-              <a:rPr lang="en-US" smtClean="0"/>
+              <a:rPr lang="en-US"/>
               <a:t>Fourth level</a:t>
             </a:r>
           </a:p>
           <a:p>
             <a:pPr lvl="4"/>
             <a:r>
-              <a:rPr lang="en-US" smtClean="0"/>
+              <a:rPr lang="en-US"/>
               <a:t>Fifth level</a:t>
             </a:r>
             <a:endParaRPr lang="en-GB"/>
@@ -2237,7 +2237,7 @@
           <a:p>
             <a:fld id="{3C74E0FF-AD0F-4BA0-BE2E-166FF3A2BE35}" type="datetimeFigureOut">
               <a:rPr lang="en-GB" smtClean="0"/>
-              <a:t>24/11/2015</a:t>
+              <a:t>23/07/2016</a:t>
             </a:fld>
             <a:endParaRPr lang="en-GB"/>
           </a:p>
@@ -2340,7 +2340,7 @@
           </a:lstStyle>
           <a:p>
             <a:r>
-              <a:rPr lang="en-US" smtClean="0"/>
+              <a:rPr lang="en-US"/>
               <a:t>Click to edit Master title style</a:t>
             </a:r>
             <a:endParaRPr lang="en-GB"/>
@@ -2460,7 +2460,7 @@
           <a:p>
             <a:pPr lvl="0"/>
             <a:r>
-              <a:rPr lang="en-US" smtClean="0"/>
+              <a:rPr lang="en-US"/>
               <a:t>Click to edit Master text styles</a:t>
             </a:r>
           </a:p>
@@ -2483,7 +2483,7 @@
           <a:p>
             <a:fld id="{3C74E0FF-AD0F-4BA0-BE2E-166FF3A2BE35}" type="datetimeFigureOut">
               <a:rPr lang="en-GB" smtClean="0"/>
-              <a:t>24/11/2015</a:t>
+              <a:t>23/07/2016</a:t>
             </a:fld>
             <a:endParaRPr lang="en-GB"/>
           </a:p>
@@ -2577,7 +2577,7 @@
           <a:lstStyle/>
           <a:p>
             <a:r>
-              <a:rPr lang="en-US" smtClean="0"/>
+              <a:rPr lang="en-US"/>
               <a:t>Click to edit Master title style</a:t>
             </a:r>
             <a:endParaRPr lang="en-GB"/>
@@ -2606,35 +2606,35 @@
           <a:p>
             <a:pPr lvl="0"/>
             <a:r>
-              <a:rPr lang="en-US" smtClean="0"/>
+              <a:rPr lang="en-US"/>
               <a:t>Click to edit Master text styles</a:t>
             </a:r>
           </a:p>
           <a:p>
             <a:pPr lvl="1"/>
             <a:r>
-              <a:rPr lang="en-US" smtClean="0"/>
+              <a:rPr lang="en-US"/>
               <a:t>Second level</a:t>
             </a:r>
           </a:p>
           <a:p>
             <a:pPr lvl="2"/>
             <a:r>
-              <a:rPr lang="en-US" smtClean="0"/>
+              <a:rPr lang="en-US"/>
               <a:t>Third level</a:t>
             </a:r>
           </a:p>
           <a:p>
             <a:pPr lvl="3"/>
             <a:r>
-              <a:rPr lang="en-US" smtClean="0"/>
+              <a:rPr lang="en-US"/>
               <a:t>Fourth level</a:t>
             </a:r>
           </a:p>
           <a:p>
             <a:pPr lvl="4"/>
             <a:r>
-              <a:rPr lang="en-US" smtClean="0"/>
+              <a:rPr lang="en-US"/>
               <a:t>Fifth level</a:t>
             </a:r>
             <a:endParaRPr lang="en-GB"/>
@@ -2663,35 +2663,35 @@
           <a:p>
             <a:pPr lvl="0"/>
             <a:r>
-              <a:rPr lang="en-US" smtClean="0"/>
+              <a:rPr lang="en-US"/>
               <a:t>Click to edit Master text styles</a:t>
             </a:r>
           </a:p>
           <a:p>
             <a:pPr lvl="1"/>
             <a:r>
-              <a:rPr lang="en-US" smtClean="0"/>
+              <a:rPr lang="en-US"/>
               <a:t>Second level</a:t>
             </a:r>
           </a:p>
           <a:p>
             <a:pPr lvl="2"/>
             <a:r>
-              <a:rPr lang="en-US" smtClean="0"/>
+              <a:rPr lang="en-US"/>
               <a:t>Third level</a:t>
             </a:r>
           </a:p>
           <a:p>
             <a:pPr lvl="3"/>
             <a:r>
-              <a:rPr lang="en-US" smtClean="0"/>
+              <a:rPr lang="en-US"/>
               <a:t>Fourth level</a:t>
             </a:r>
           </a:p>
           <a:p>
             <a:pPr lvl="4"/>
             <a:r>
-              <a:rPr lang="en-US" smtClean="0"/>
+              <a:rPr lang="en-US"/>
               <a:t>Fifth level</a:t>
             </a:r>
             <a:endParaRPr lang="en-GB"/>
@@ -2715,7 +2715,7 @@
           <a:p>
             <a:fld id="{3C74E0FF-AD0F-4BA0-BE2E-166FF3A2BE35}" type="datetimeFigureOut">
               <a:rPr lang="en-GB" smtClean="0"/>
-              <a:t>24/11/2015</a:t>
+              <a:t>23/07/2016</a:t>
             </a:fld>
             <a:endParaRPr lang="en-GB"/>
           </a:p>
@@ -2814,7 +2814,7 @@
           <a:lstStyle/>
           <a:p>
             <a:r>
-              <a:rPr lang="en-US" smtClean="0"/>
+              <a:rPr lang="en-US"/>
               <a:t>Click to edit Master title style</a:t>
             </a:r>
             <a:endParaRPr lang="en-GB"/>
@@ -2880,7 +2880,7 @@
           <a:p>
             <a:pPr lvl="0"/>
             <a:r>
-              <a:rPr lang="en-US" smtClean="0"/>
+              <a:rPr lang="en-US"/>
               <a:t>Click to edit Master text styles</a:t>
             </a:r>
           </a:p>
@@ -2908,35 +2908,35 @@
           <a:p>
             <a:pPr lvl="0"/>
             <a:r>
-              <a:rPr lang="en-US" smtClean="0"/>
+              <a:rPr lang="en-US"/>
               <a:t>Click to edit Master text styles</a:t>
             </a:r>
           </a:p>
           <a:p>
             <a:pPr lvl="1"/>
             <a:r>
-              <a:rPr lang="en-US" smtClean="0"/>
+              <a:rPr lang="en-US"/>
               <a:t>Second level</a:t>
             </a:r>
           </a:p>
           <a:p>
             <a:pPr lvl="2"/>
             <a:r>
-              <a:rPr lang="en-US" smtClean="0"/>
+              <a:rPr lang="en-US"/>
               <a:t>Third level</a:t>
             </a:r>
           </a:p>
           <a:p>
             <a:pPr lvl="3"/>
             <a:r>
-              <a:rPr lang="en-US" smtClean="0"/>
+              <a:rPr lang="en-US"/>
               <a:t>Fourth level</a:t>
             </a:r>
           </a:p>
           <a:p>
             <a:pPr lvl="4"/>
             <a:r>
-              <a:rPr lang="en-US" smtClean="0"/>
+              <a:rPr lang="en-US"/>
               <a:t>Fifth level</a:t>
             </a:r>
             <a:endParaRPr lang="en-GB"/>
@@ -3002,7 +3002,7 @@
           <a:p>
             <a:pPr lvl="0"/>
             <a:r>
-              <a:rPr lang="en-US" smtClean="0"/>
+              <a:rPr lang="en-US"/>
               <a:t>Click to edit Master text styles</a:t>
             </a:r>
           </a:p>
@@ -3030,35 +3030,35 @@
           <a:p>
             <a:pPr lvl="0"/>
             <a:r>
-              <a:rPr lang="en-US" smtClean="0"/>
+              <a:rPr lang="en-US"/>
               <a:t>Click to edit Master text styles</a:t>
             </a:r>
           </a:p>
           <a:p>
             <a:pPr lvl="1"/>
             <a:r>
-              <a:rPr lang="en-US" smtClean="0"/>
+              <a:rPr lang="en-US"/>
               <a:t>Second level</a:t>
             </a:r>
           </a:p>
           <a:p>
             <a:pPr lvl="2"/>
             <a:r>
-              <a:rPr lang="en-US" smtClean="0"/>
+              <a:rPr lang="en-US"/>
               <a:t>Third level</a:t>
             </a:r>
           </a:p>
           <a:p>
             <a:pPr lvl="3"/>
             <a:r>
-              <a:rPr lang="en-US" smtClean="0"/>
+              <a:rPr lang="en-US"/>
               <a:t>Fourth level</a:t>
             </a:r>
           </a:p>
           <a:p>
             <a:pPr lvl="4"/>
             <a:r>
-              <a:rPr lang="en-US" smtClean="0"/>
+              <a:rPr lang="en-US"/>
               <a:t>Fifth level</a:t>
             </a:r>
             <a:endParaRPr lang="en-GB"/>
@@ -3082,7 +3082,7 @@
           <a:p>
             <a:fld id="{3C74E0FF-AD0F-4BA0-BE2E-166FF3A2BE35}" type="datetimeFigureOut">
               <a:rPr lang="en-GB" smtClean="0"/>
-              <a:t>24/11/2015</a:t>
+              <a:t>23/07/2016</a:t>
             </a:fld>
             <a:endParaRPr lang="en-GB"/>
           </a:p>
@@ -3176,7 +3176,7 @@
           <a:lstStyle/>
           <a:p>
             <a:r>
-              <a:rPr lang="en-US" smtClean="0"/>
+              <a:rPr lang="en-US"/>
               <a:t>Click to edit Master title style</a:t>
             </a:r>
             <a:endParaRPr lang="en-GB"/>
@@ -3200,7 +3200,7 @@
           <a:p>
             <a:fld id="{3C74E0FF-AD0F-4BA0-BE2E-166FF3A2BE35}" type="datetimeFigureOut">
               <a:rPr lang="en-GB" smtClean="0"/>
-              <a:t>24/11/2015</a:t>
+              <a:t>23/07/2016</a:t>
             </a:fld>
             <a:endParaRPr lang="en-GB"/>
           </a:p>
@@ -3295,7 +3295,7 @@
           <a:p>
             <a:fld id="{3C74E0FF-AD0F-4BA0-BE2E-166FF3A2BE35}" type="datetimeFigureOut">
               <a:rPr lang="en-GB" smtClean="0"/>
-              <a:t>24/11/2015</a:t>
+              <a:t>23/07/2016</a:t>
             </a:fld>
             <a:endParaRPr lang="en-GB"/>
           </a:p>
@@ -3398,7 +3398,7 @@
           </a:lstStyle>
           <a:p>
             <a:r>
-              <a:rPr lang="en-US" smtClean="0"/>
+              <a:rPr lang="en-US"/>
               <a:t>Click to edit Master title style</a:t>
             </a:r>
             <a:endParaRPr lang="en-GB"/>
@@ -3455,35 +3455,35 @@
           <a:p>
             <a:pPr lvl="0"/>
             <a:r>
-              <a:rPr lang="en-US" smtClean="0"/>
+              <a:rPr lang="en-US"/>
               <a:t>Click to edit Master text styles</a:t>
             </a:r>
           </a:p>
           <a:p>
             <a:pPr lvl="1"/>
             <a:r>
-              <a:rPr lang="en-US" smtClean="0"/>
+              <a:rPr lang="en-US"/>
               <a:t>Second level</a:t>
             </a:r>
           </a:p>
           <a:p>
             <a:pPr lvl="2"/>
             <a:r>
-              <a:rPr lang="en-US" smtClean="0"/>
+              <a:rPr lang="en-US"/>
               <a:t>Third level</a:t>
             </a:r>
           </a:p>
           <a:p>
             <a:pPr lvl="3"/>
             <a:r>
-              <a:rPr lang="en-US" smtClean="0"/>
+              <a:rPr lang="en-US"/>
               <a:t>Fourth level</a:t>
             </a:r>
           </a:p>
           <a:p>
             <a:pPr lvl="4"/>
             <a:r>
-              <a:rPr lang="en-US" smtClean="0"/>
+              <a:rPr lang="en-US"/>
               <a:t>Fifth level</a:t>
             </a:r>
             <a:endParaRPr lang="en-GB"/>
@@ -3549,7 +3549,7 @@
           <a:p>
             <a:pPr lvl="0"/>
             <a:r>
-              <a:rPr lang="en-US" smtClean="0"/>
+              <a:rPr lang="en-US"/>
               <a:t>Click to edit Master text styles</a:t>
             </a:r>
           </a:p>
@@ -3572,7 +3572,7 @@
           <a:p>
             <a:fld id="{3C74E0FF-AD0F-4BA0-BE2E-166FF3A2BE35}" type="datetimeFigureOut">
               <a:rPr lang="en-GB" smtClean="0"/>
-              <a:t>24/11/2015</a:t>
+              <a:t>23/07/2016</a:t>
             </a:fld>
             <a:endParaRPr lang="en-GB"/>
           </a:p>
@@ -3675,7 +3675,7 @@
           </a:lstStyle>
           <a:p>
             <a:r>
-              <a:rPr lang="en-US" smtClean="0"/>
+              <a:rPr lang="en-US"/>
               <a:t>Click to edit Master title style</a:t>
             </a:r>
             <a:endParaRPr lang="en-GB"/>
@@ -3802,7 +3802,7 @@
           <a:p>
             <a:pPr lvl="0"/>
             <a:r>
-              <a:rPr lang="en-US" smtClean="0"/>
+              <a:rPr lang="en-US"/>
               <a:t>Click to edit Master text styles</a:t>
             </a:r>
           </a:p>
@@ -3825,7 +3825,7 @@
           <a:p>
             <a:fld id="{3C74E0FF-AD0F-4BA0-BE2E-166FF3A2BE35}" type="datetimeFigureOut">
               <a:rPr lang="en-GB" smtClean="0"/>
-              <a:t>24/11/2015</a:t>
+              <a:t>23/07/2016</a:t>
             </a:fld>
             <a:endParaRPr lang="en-GB"/>
           </a:p>
@@ -3934,7 +3934,7 @@
           <a:lstStyle/>
           <a:p>
             <a:r>
-              <a:rPr lang="en-US" smtClean="0"/>
+              <a:rPr lang="en-US"/>
               <a:t>Click to edit Master title style</a:t>
             </a:r>
             <a:endParaRPr lang="en-GB"/>
@@ -3968,35 +3968,35 @@
           <a:p>
             <a:pPr lvl="0"/>
             <a:r>
-              <a:rPr lang="en-US" smtClean="0"/>
+              <a:rPr lang="en-US"/>
               <a:t>Click to edit Master text styles</a:t>
             </a:r>
           </a:p>
           <a:p>
             <a:pPr lvl="1"/>
             <a:r>
-              <a:rPr lang="en-US" smtClean="0"/>
+              <a:rPr lang="en-US"/>
               <a:t>Second level</a:t>
             </a:r>
           </a:p>
           <a:p>
             <a:pPr lvl="2"/>
             <a:r>
-              <a:rPr lang="en-US" smtClean="0"/>
+              <a:rPr lang="en-US"/>
               <a:t>Third level</a:t>
             </a:r>
           </a:p>
           <a:p>
             <a:pPr lvl="3"/>
             <a:r>
-              <a:rPr lang="en-US" smtClean="0"/>
+              <a:rPr lang="en-US"/>
               <a:t>Fourth level</a:t>
             </a:r>
           </a:p>
           <a:p>
             <a:pPr lvl="4"/>
             <a:r>
-              <a:rPr lang="en-US" smtClean="0"/>
+              <a:rPr lang="en-US"/>
               <a:t>Fifth level</a:t>
             </a:r>
             <a:endParaRPr lang="en-GB"/>
@@ -4038,7 +4038,7 @@
           <a:p>
             <a:fld id="{3C74E0FF-AD0F-4BA0-BE2E-166FF3A2BE35}" type="datetimeFigureOut">
               <a:rPr lang="en-GB" smtClean="0"/>
-              <a:t>24/11/2015</a:t>
+              <a:t>23/07/2016</a:t>
             </a:fld>
             <a:endParaRPr lang="en-GB"/>
           </a:p>
@@ -4486,10 +4486,9 @@
           <a:p>
             <a:pPr algn="ctr"/>
             <a:r>
-              <a:rPr lang="en-GB" dirty="0" smtClean="0"/>
+              <a:rPr lang="en-GB" dirty="0"/>
               <a:t> </a:t>
             </a:r>
-            <a:endParaRPr lang="en-GB" dirty="0"/>
           </a:p>
         </p:txBody>
       </p:sp>
@@ -4516,17 +4515,16 @@
           <a:lstStyle/>
           <a:p>
             <a:r>
-              <a:rPr lang="en-GB" dirty="0" smtClean="0"/>
+              <a:rPr lang="en-GB" dirty="0"/>
               <a:t>Windows PowerShell</a:t>
             </a:r>
             <a:br>
-              <a:rPr lang="en-GB" dirty="0" smtClean="0"/>
+              <a:rPr lang="en-GB" dirty="0"/>
             </a:br>
             <a:r>
-              <a:rPr lang="en-GB" dirty="0" smtClean="0"/>
+              <a:rPr lang="en-GB" dirty="0"/>
               <a:t> An Introduction</a:t>
             </a:r>
-            <a:endParaRPr lang="en-GB" dirty="0"/>
           </a:p>
         </p:txBody>
       </p:sp>
@@ -4553,12 +4551,12 @@
           <a:lstStyle/>
           <a:p>
             <a:r>
-              <a:rPr lang="en-GB" sz="3000" dirty="0" smtClean="0"/>
+              <a:rPr lang="en-GB" sz="3000" dirty="0"/>
               <a:t>Points to Consider</a:t>
             </a:r>
           </a:p>
           <a:p>
-            <a:endParaRPr lang="en-GB" sz="1800" dirty="0" smtClean="0"/>
+            <a:endParaRPr lang="en-GB" sz="1800" dirty="0"/>
           </a:p>
           <a:p>
             <a:pPr marL="342900" indent="-342900">
@@ -4566,7 +4564,7 @@
               <a:buChar char="•"/>
             </a:pPr>
             <a:r>
-              <a:rPr lang="en-GB" dirty="0" smtClean="0"/>
+              <a:rPr lang="en-GB" dirty="0"/>
               <a:t>Technology is now 10 years old</a:t>
             </a:r>
           </a:p>
@@ -4576,7 +4574,7 @@
               <a:buChar char="•"/>
             </a:pPr>
             <a:r>
-              <a:rPr lang="en-GB" dirty="0" smtClean="0"/>
+              <a:rPr lang="en-GB" dirty="0"/>
               <a:t>Widely adopted across all of Microsoft Stack</a:t>
             </a:r>
           </a:p>
@@ -4586,16 +4584,8 @@
               <a:buChar char="•"/>
             </a:pPr>
             <a:r>
-              <a:rPr lang="en-GB" dirty="0" smtClean="0"/>
-              <a:t>A </a:t>
-            </a:r>
-            <a:r>
-              <a:rPr lang="en-GB" dirty="0" smtClean="0"/>
-              <a:t>programming language </a:t>
-            </a:r>
-            <a:r>
-              <a:rPr lang="en-GB" dirty="0" smtClean="0"/>
-              <a:t>for automation at scale</a:t>
+              <a:rPr lang="en-GB" dirty="0"/>
+              <a:t>A programming language for automation at scale</a:t>
             </a:r>
           </a:p>
           <a:p>
@@ -4604,7 +4594,7 @@
               <a:buChar char="•"/>
             </a:pPr>
             <a:r>
-              <a:rPr lang="en-GB" dirty="0" smtClean="0"/>
+              <a:rPr lang="en-GB" dirty="0"/>
               <a:t>Object Orientated </a:t>
             </a:r>
           </a:p>
@@ -4614,7 +4604,7 @@
               <a:buChar char="•"/>
             </a:pPr>
             <a:r>
-              <a:rPr lang="en-GB" dirty="0" smtClean="0"/>
+              <a:rPr lang="en-GB" dirty="0"/>
               <a:t>Simpler than VBScript</a:t>
             </a:r>
           </a:p>
@@ -4623,7 +4613,7 @@
               <a:buFont typeface="Arial" panose="020B0604020202020204" pitchFamily="34" charset="0"/>
               <a:buChar char="•"/>
             </a:pPr>
-            <a:endParaRPr lang="en-GB" dirty="0" smtClean="0"/>
+            <a:endParaRPr lang="en-GB" dirty="0"/>
           </a:p>
           <a:p>
             <a:pPr marL="342900" indent="-342900">
@@ -4687,16 +4677,15 @@
           <a:lstStyle/>
           <a:p>
             <a:r>
-              <a:rPr lang="en-GB" dirty="0" smtClean="0"/>
+              <a:rPr lang="en-GB" dirty="0"/>
               <a:t>Ryan Yates - @ryanyates1990</a:t>
             </a:r>
           </a:p>
           <a:p>
             <a:r>
-              <a:rPr lang="en-GB" dirty="0" smtClean="0"/>
+              <a:rPr lang="en-GB" dirty="0"/>
               <a:t>User Group co-ordinator for PowerShell User Groups in UK</a:t>
             </a:r>
-            <a:endParaRPr lang="en-GB" dirty="0"/>
           </a:p>
         </p:txBody>
       </p:sp>
@@ -5198,14 +5187,9 @@
           <a:lstStyle/>
           <a:p>
             <a:r>
-              <a:rPr lang="en-GB" dirty="0" smtClean="0"/>
-              <a:t>Timelin</a:t>
-            </a:r>
-            <a:r>
-              <a:rPr lang="en-GB" dirty="0" smtClean="0"/>
-              <a:t>e – 2005/2006</a:t>
-            </a:r>
-            <a:endParaRPr lang="en-GB" dirty="0"/>
+              <a:rPr lang="en-GB" dirty="0"/>
+              <a:t>Timeline – 2005/2006</a:t>
+            </a:r>
           </a:p>
         </p:txBody>
       </p:sp>
@@ -5236,15 +5220,15 @@
               <a:buChar char="•"/>
             </a:pPr>
             <a:r>
-              <a:rPr lang="en-GB" sz="2800" dirty="0" smtClean="0"/>
+              <a:rPr lang="en-GB" sz="2800" dirty="0"/>
               <a:t>First Public Beta released on June 17</a:t>
             </a:r>
             <a:r>
-              <a:rPr lang="en-GB" sz="2800" baseline="30000" dirty="0" smtClean="0"/>
+              <a:rPr lang="en-GB" sz="2800" baseline="30000" dirty="0"/>
               <a:t>th</a:t>
             </a:r>
             <a:r>
-              <a:rPr lang="en-GB" sz="2800" dirty="0" smtClean="0"/>
+              <a:rPr lang="en-GB" sz="2800" dirty="0"/>
               <a:t> 2005</a:t>
             </a:r>
           </a:p>
@@ -5261,15 +5245,15 @@
               <a:buChar char="•"/>
             </a:pPr>
             <a:r>
-              <a:rPr lang="en-GB" sz="2800" dirty="0" smtClean="0"/>
+              <a:rPr lang="en-GB" sz="2800" dirty="0"/>
               <a:t>Second public beta released September 11</a:t>
             </a:r>
             <a:r>
-              <a:rPr lang="en-GB" sz="2800" baseline="30000" dirty="0" smtClean="0"/>
+              <a:rPr lang="en-GB" sz="2800" baseline="30000" dirty="0"/>
               <a:t>th</a:t>
             </a:r>
             <a:r>
-              <a:rPr lang="en-GB" sz="2800" dirty="0" smtClean="0"/>
+              <a:rPr lang="en-GB" sz="2800" dirty="0"/>
               <a:t> 2005</a:t>
             </a:r>
           </a:p>
@@ -5286,15 +5270,15 @@
               <a:buChar char="•"/>
             </a:pPr>
             <a:r>
-              <a:rPr lang="en-GB" sz="2800" dirty="0" smtClean="0"/>
+              <a:rPr lang="en-GB" sz="2800" dirty="0"/>
               <a:t>Third Pubic beta released January 10</a:t>
             </a:r>
             <a:r>
-              <a:rPr lang="en-GB" sz="2800" baseline="30000" dirty="0" smtClean="0"/>
+              <a:rPr lang="en-GB" sz="2800" baseline="30000" dirty="0"/>
               <a:t>th</a:t>
             </a:r>
             <a:r>
-              <a:rPr lang="en-GB" sz="2800" dirty="0" smtClean="0"/>
+              <a:rPr lang="en-GB" sz="2800" dirty="0"/>
               <a:t> 2006</a:t>
             </a:r>
           </a:p>
@@ -5311,23 +5295,23 @@
               <a:buChar char="•"/>
             </a:pPr>
             <a:r>
-              <a:rPr lang="en-GB" sz="2800" dirty="0" smtClean="0"/>
+              <a:rPr lang="en-GB" sz="2800" dirty="0"/>
               <a:t>Renamed Windows </a:t>
             </a:r>
             <a:r>
-              <a:rPr lang="en-GB" sz="2800" dirty="0" err="1" smtClean="0"/>
+              <a:rPr lang="en-GB" sz="2800" dirty="0" err="1"/>
               <a:t>Powershell</a:t>
             </a:r>
             <a:r>
-              <a:rPr lang="en-GB" sz="2800" dirty="0" smtClean="0"/>
+              <a:rPr lang="en-GB" sz="2800" dirty="0"/>
               <a:t> on April 25</a:t>
             </a:r>
             <a:r>
-              <a:rPr lang="en-GB" sz="2800" baseline="30000" dirty="0" smtClean="0"/>
+              <a:rPr lang="en-GB" sz="2800" baseline="30000" dirty="0"/>
               <a:t>th</a:t>
             </a:r>
             <a:r>
-              <a:rPr lang="en-GB" sz="2800" dirty="0" smtClean="0"/>
+              <a:rPr lang="en-GB" sz="2800" dirty="0"/>
               <a:t> 2006 (just a month before I started my GCSE Exams) and Release Candidate 1 Released at this time as well</a:t>
             </a:r>
           </a:p>
@@ -5344,15 +5328,15 @@
               <a:buChar char="•"/>
             </a:pPr>
             <a:r>
-              <a:rPr lang="en-GB" sz="2800" dirty="0" smtClean="0"/>
+              <a:rPr lang="en-GB" sz="2800" dirty="0"/>
               <a:t>Release Candidate 2 released September 26</a:t>
             </a:r>
             <a:r>
-              <a:rPr lang="en-GB" sz="2800" baseline="30000" dirty="0" smtClean="0"/>
+              <a:rPr lang="en-GB" sz="2800" baseline="30000" dirty="0"/>
               <a:t>th</a:t>
             </a:r>
             <a:r>
-              <a:rPr lang="en-GB" sz="2800" dirty="0" smtClean="0"/>
+              <a:rPr lang="en-GB" sz="2800" dirty="0"/>
               <a:t> 2006</a:t>
             </a:r>
           </a:p>
@@ -5369,15 +5353,15 @@
               <a:buChar char="•"/>
             </a:pPr>
             <a:r>
-              <a:rPr lang="en-GB" sz="2800" dirty="0" smtClean="0"/>
+              <a:rPr lang="en-GB" sz="2800" dirty="0"/>
               <a:t>Release to Web (</a:t>
             </a:r>
             <a:r>
-              <a:rPr lang="en-GB" sz="2800" dirty="0" err="1" smtClean="0"/>
+              <a:rPr lang="en-GB" sz="2800" dirty="0" err="1"/>
               <a:t>Powershell</a:t>
             </a:r>
             <a:r>
-              <a:rPr lang="en-GB" sz="2800" dirty="0" smtClean="0"/>
+              <a:rPr lang="en-GB" sz="2800" dirty="0"/>
               <a:t> v1) announced at TechEd in Barcelona on November 2006</a:t>
             </a:r>
           </a:p>
@@ -5393,13 +5377,6 @@
   <p:clrMapOvr>
     <a:masterClrMapping/>
   </p:clrMapOvr>
-  <p:timing>
-    <p:tnLst>
-      <p:par>
-        <p:cTn id="1" dur="indefinite" restart="never" nodeType="tmRoot"/>
-      </p:par>
-    </p:tnLst>
-  </p:timing>
 </p:sld>
 </file>
 
@@ -5489,10 +5466,9 @@
           <a:lstStyle/>
           <a:p>
             <a:r>
-              <a:rPr lang="en-GB" dirty="0" smtClean="0"/>
+              <a:rPr lang="en-GB" dirty="0"/>
               <a:t>v1 – or was is really a v0.7?</a:t>
             </a:r>
-            <a:endParaRPr lang="en-GB" dirty="0"/>
           </a:p>
         </p:txBody>
       </p:sp>
@@ -5519,7 +5495,7 @@
           <a:lstStyle/>
           <a:p>
             <a:r>
-              <a:rPr lang="en-GB" sz="2800" dirty="0" smtClean="0"/>
+              <a:rPr lang="en-GB" sz="2800" dirty="0"/>
               <a:t>Pros</a:t>
             </a:r>
           </a:p>
@@ -5529,7 +5505,7 @@
               <a:buChar char="•"/>
             </a:pPr>
             <a:r>
-              <a:rPr lang="en-GB" sz="2800" dirty="0" smtClean="0"/>
+              <a:rPr lang="en-GB" sz="2800" dirty="0"/>
               <a:t>Cmdlets used Verb-Noun naming convention</a:t>
             </a:r>
           </a:p>
@@ -5539,11 +5515,11 @@
               <a:buChar char="•"/>
             </a:pPr>
             <a:r>
-              <a:rPr lang="en-GB" sz="2800" dirty="0" err="1" smtClean="0"/>
+              <a:rPr lang="en-GB" sz="2800" dirty="0" err="1"/>
               <a:t>Builtin</a:t>
             </a:r>
             <a:r>
-              <a:rPr lang="en-GB" sz="2800" dirty="0" smtClean="0"/>
+              <a:rPr lang="en-GB" sz="2800" dirty="0"/>
               <a:t> help for the Cmdlets</a:t>
             </a:r>
           </a:p>
@@ -5553,15 +5529,15 @@
               <a:buChar char="•"/>
             </a:pPr>
             <a:r>
-              <a:rPr lang="en-GB" sz="2800" dirty="0" smtClean="0"/>
+              <a:rPr lang="en-GB" sz="2800" dirty="0"/>
               <a:t>Could be extended with </a:t>
             </a:r>
             <a:r>
-              <a:rPr lang="en-GB" sz="2800" dirty="0" err="1" smtClean="0"/>
+              <a:rPr lang="en-GB" sz="2800" dirty="0" err="1"/>
               <a:t>PSSnapins</a:t>
             </a:r>
             <a:r>
-              <a:rPr lang="en-GB" sz="2800" dirty="0" smtClean="0"/>
+              <a:rPr lang="en-GB" sz="2800" dirty="0"/>
               <a:t> – Exchange &amp; SharePoint did this</a:t>
             </a:r>
           </a:p>
@@ -5597,7 +5573,7 @@
           <a:lstStyle/>
           <a:p>
             <a:r>
-              <a:rPr lang="en-GB" sz="2800" dirty="0" smtClean="0"/>
+              <a:rPr lang="en-GB" sz="2800" dirty="0"/>
               <a:t>Cons</a:t>
             </a:r>
           </a:p>
@@ -5607,15 +5583,15 @@
               <a:buChar char="•"/>
             </a:pPr>
             <a:r>
-              <a:rPr lang="en-GB" sz="2800" dirty="0" smtClean="0"/>
+              <a:rPr lang="en-GB" sz="2800" dirty="0"/>
               <a:t>Hard to extend – </a:t>
             </a:r>
             <a:r>
-              <a:rPr lang="en-GB" sz="2800" dirty="0" err="1" smtClean="0"/>
+              <a:rPr lang="en-GB" sz="2800" dirty="0" err="1"/>
               <a:t>PSSnapins</a:t>
             </a:r>
             <a:r>
-              <a:rPr lang="en-GB" sz="2800" dirty="0" smtClean="0"/>
+              <a:rPr lang="en-GB" sz="2800" dirty="0"/>
               <a:t> are compiled code and you need to have development knowledge to build them</a:t>
             </a:r>
           </a:p>
@@ -5625,7 +5601,7 @@
               <a:buChar char="•"/>
             </a:pPr>
             <a:r>
-              <a:rPr lang="en-GB" sz="2800" dirty="0" smtClean="0"/>
+              <a:rPr lang="en-GB" sz="2800" dirty="0"/>
               <a:t>No module functionality</a:t>
             </a:r>
           </a:p>
@@ -5635,7 +5611,7 @@
               <a:buChar char="•"/>
             </a:pPr>
             <a:r>
-              <a:rPr lang="en-GB" sz="2800" dirty="0" smtClean="0"/>
+              <a:rPr lang="en-GB" sz="2800" dirty="0"/>
               <a:t>Basic functionality</a:t>
             </a:r>
           </a:p>
@@ -5645,7 +5621,7 @@
               <a:buChar char="•"/>
             </a:pPr>
             <a:r>
-              <a:rPr lang="en-GB" sz="2800" dirty="0" smtClean="0"/>
+              <a:rPr lang="en-GB" sz="2800" dirty="0"/>
               <a:t>No bundled Development environment – third party options existed</a:t>
             </a:r>
           </a:p>
@@ -5655,7 +5631,7 @@
               <a:buChar char="•"/>
             </a:pPr>
             <a:r>
-              <a:rPr lang="en-GB" sz="2800" dirty="0" smtClean="0"/>
+              <a:rPr lang="en-GB" sz="2800" dirty="0"/>
               <a:t>Hard to share any scripts</a:t>
             </a:r>
           </a:p>
@@ -5671,13 +5647,6 @@
   <p:clrMapOvr>
     <a:masterClrMapping/>
   </p:clrMapOvr>
-  <p:timing>
-    <p:tnLst>
-      <p:par>
-        <p:cTn id="1" dur="indefinite" restart="never" nodeType="tmRoot"/>
-      </p:par>
-    </p:tnLst>
-  </p:timing>
 </p:sld>
 </file>
 
@@ -5767,10 +5736,9 @@
           <a:lstStyle/>
           <a:p>
             <a:r>
-              <a:rPr lang="en-GB" dirty="0" smtClean="0"/>
+              <a:rPr lang="en-GB" dirty="0"/>
               <a:t>v2 – A real v1 - 2009</a:t>
             </a:r>
-            <a:endParaRPr lang="en-GB" dirty="0"/>
           </a:p>
         </p:txBody>
       </p:sp>
@@ -5797,7 +5765,7 @@
           <a:lstStyle/>
           <a:p>
             <a:r>
-              <a:rPr lang="en-GB" sz="2800" dirty="0" smtClean="0"/>
+              <a:rPr lang="en-GB" sz="2800" dirty="0"/>
               <a:t>Pros</a:t>
             </a:r>
           </a:p>
@@ -5807,7 +5775,7 @@
               <a:buChar char="•"/>
             </a:pPr>
             <a:r>
-              <a:rPr lang="en-GB" sz="2800" dirty="0" smtClean="0"/>
+              <a:rPr lang="en-GB" sz="2800" dirty="0"/>
               <a:t>Module support – easier extendibility</a:t>
             </a:r>
           </a:p>
@@ -5817,7 +5785,7 @@
               <a:buChar char="•"/>
             </a:pPr>
             <a:r>
-              <a:rPr lang="en-GB" sz="2800" dirty="0" smtClean="0"/>
+              <a:rPr lang="en-GB" sz="2800" dirty="0"/>
               <a:t>PowerShell ISE bundled with</a:t>
             </a:r>
           </a:p>
@@ -5827,7 +5795,7 @@
               <a:buChar char="•"/>
             </a:pPr>
             <a:r>
-              <a:rPr lang="en-GB" sz="2800" dirty="0" smtClean="0"/>
+              <a:rPr lang="en-GB" sz="2800" dirty="0"/>
               <a:t>Part of Windows 7 &amp; Server 2008 R2</a:t>
             </a:r>
           </a:p>
@@ -5837,7 +5805,7 @@
               <a:buChar char="•"/>
             </a:pPr>
             <a:r>
-              <a:rPr lang="en-GB" sz="2800" dirty="0" smtClean="0"/>
+              <a:rPr lang="en-GB" sz="2800" dirty="0"/>
               <a:t>Avail for XP, Vista, 2003 &amp; 2008 via Microsoft Downloads</a:t>
             </a:r>
           </a:p>
@@ -5847,7 +5815,7 @@
               <a:buChar char="•"/>
             </a:pPr>
             <a:r>
-              <a:rPr lang="en-GB" sz="2800" dirty="0" smtClean="0"/>
+              <a:rPr lang="en-GB" sz="2800" dirty="0"/>
               <a:t>32 &amp; 64 bit support introduced </a:t>
             </a:r>
           </a:p>
@@ -5857,19 +5825,19 @@
               <a:buChar char="•"/>
             </a:pPr>
             <a:r>
-              <a:rPr lang="en-GB" sz="2800" dirty="0" err="1" smtClean="0"/>
+              <a:rPr lang="en-GB" sz="2800" dirty="0" err="1"/>
               <a:t>PSRemoting</a:t>
             </a:r>
             <a:r>
-              <a:rPr lang="en-GB" sz="2800" dirty="0" smtClean="0"/>
+              <a:rPr lang="en-GB" sz="2800" dirty="0"/>
               <a:t> and </a:t>
             </a:r>
             <a:r>
-              <a:rPr lang="en-GB" sz="2800" dirty="0" err="1" smtClean="0"/>
+              <a:rPr lang="en-GB" sz="2800" dirty="0" err="1"/>
               <a:t>PSJobs</a:t>
             </a:r>
             <a:r>
-              <a:rPr lang="en-GB" sz="2800" dirty="0" smtClean="0"/>
+              <a:rPr lang="en-GB" sz="2800" dirty="0"/>
               <a:t> introduced</a:t>
             </a:r>
           </a:p>
@@ -5905,7 +5873,7 @@
           <a:lstStyle/>
           <a:p>
             <a:r>
-              <a:rPr lang="en-GB" sz="2800" dirty="0" smtClean="0"/>
+              <a:rPr lang="en-GB" sz="2800" dirty="0"/>
               <a:t>Cons</a:t>
             </a:r>
           </a:p>
@@ -5915,15 +5883,15 @@
               <a:buChar char="•"/>
             </a:pPr>
             <a:r>
-              <a:rPr lang="en-GB" sz="2800" dirty="0" smtClean="0"/>
+              <a:rPr lang="en-GB" sz="2800" dirty="0"/>
               <a:t>ISE had no </a:t>
             </a:r>
             <a:r>
-              <a:rPr lang="en-GB" sz="2800" dirty="0" err="1" smtClean="0"/>
+              <a:rPr lang="en-GB" sz="2800" dirty="0" err="1"/>
               <a:t>intellisense</a:t>
             </a:r>
             <a:r>
-              <a:rPr lang="en-GB" sz="2800" dirty="0" smtClean="0"/>
+              <a:rPr lang="en-GB" sz="2800" dirty="0"/>
               <a:t> – so made scripting difficult</a:t>
             </a:r>
           </a:p>
@@ -5933,15 +5901,15 @@
               <a:buChar char="•"/>
             </a:pPr>
             <a:r>
-              <a:rPr lang="en-GB" sz="2800" dirty="0" smtClean="0"/>
+              <a:rPr lang="en-GB" sz="2800" dirty="0"/>
               <a:t>Built for </a:t>
             </a:r>
             <a:r>
-              <a:rPr lang="en-GB" sz="2800" dirty="0" err="1" smtClean="0"/>
+              <a:rPr lang="en-GB" sz="2800" dirty="0" err="1"/>
               <a:t>.Net</a:t>
             </a:r>
             <a:r>
-              <a:rPr lang="en-GB" sz="2800" dirty="0" smtClean="0"/>
+              <a:rPr lang="en-GB" sz="2800" dirty="0"/>
               <a:t> v2 not v4 so caused some compatibility issues going forward</a:t>
             </a:r>
           </a:p>
@@ -5951,7 +5919,7 @@
               <a:buChar char="•"/>
             </a:pPr>
             <a:r>
-              <a:rPr lang="en-GB" sz="2800" dirty="0" smtClean="0"/>
+              <a:rPr lang="en-GB" sz="2800" dirty="0"/>
               <a:t>Extended but still basic functionality</a:t>
             </a:r>
           </a:p>
@@ -5961,7 +5929,7 @@
               <a:buChar char="•"/>
             </a:pPr>
             <a:r>
-              <a:rPr lang="en-GB" sz="2800" dirty="0" smtClean="0"/>
+              <a:rPr lang="en-GB" sz="2800" dirty="0"/>
               <a:t>Best practises were not really defined</a:t>
             </a:r>
           </a:p>
@@ -5971,7 +5939,7 @@
               <a:buChar char="•"/>
             </a:pPr>
             <a:r>
-              <a:rPr lang="en-GB" sz="2800" dirty="0" smtClean="0"/>
+              <a:rPr lang="en-GB" sz="2800" dirty="0"/>
               <a:t>Still not understood as a Programming Language and seen like a GUI tool by most</a:t>
             </a:r>
           </a:p>
@@ -5987,13 +5955,6 @@
   <p:clrMapOvr>
     <a:masterClrMapping/>
   </p:clrMapOvr>
-  <p:timing>
-    <p:tnLst>
-      <p:par>
-        <p:cTn id="1" dur="indefinite" restart="never" nodeType="tmRoot"/>
-      </p:par>
-    </p:tnLst>
-  </p:timing>
 </p:sld>
 </file>
 
@@ -6083,14 +6044,9 @@
           <a:lstStyle/>
           <a:p>
             <a:r>
-              <a:rPr lang="en-GB" dirty="0" smtClean="0"/>
-              <a:t>v3</a:t>
-            </a:r>
-            <a:r>
-              <a:rPr lang="en-GB" dirty="0" smtClean="0"/>
-              <a:t> – A real v2 - 2009</a:t>
-            </a:r>
-            <a:endParaRPr lang="en-GB" dirty="0"/>
+              <a:rPr lang="en-GB" dirty="0"/>
+              <a:t>v3 – A real v2 - 2009</a:t>
+            </a:r>
           </a:p>
         </p:txBody>
       </p:sp>
@@ -6117,7 +6073,7 @@
           <a:lstStyle/>
           <a:p>
             <a:r>
-              <a:rPr lang="en-GB" sz="2800" dirty="0" smtClean="0"/>
+              <a:rPr lang="en-GB" sz="2800" dirty="0"/>
               <a:t>Pros</a:t>
             </a:r>
           </a:p>
@@ -6127,7 +6083,7 @@
               <a:buChar char="•"/>
             </a:pPr>
             <a:r>
-              <a:rPr lang="en-GB" sz="2800" dirty="0" smtClean="0"/>
+              <a:rPr lang="en-GB" sz="2800" dirty="0"/>
               <a:t>Bundled as part of WMF 3.0</a:t>
             </a:r>
           </a:p>
@@ -6137,7 +6093,7 @@
               <a:buChar char="•"/>
             </a:pPr>
             <a:r>
-              <a:rPr lang="en-GB" sz="2800" dirty="0" smtClean="0"/>
+              <a:rPr lang="en-GB" sz="2800" dirty="0"/>
               <a:t>Part of Windows 8 &amp; Server 2012</a:t>
             </a:r>
           </a:p>
@@ -6147,7 +6103,7 @@
               <a:buChar char="•"/>
             </a:pPr>
             <a:r>
-              <a:rPr lang="en-GB" sz="2800" dirty="0" smtClean="0"/>
+              <a:rPr lang="en-GB" sz="2800" dirty="0"/>
               <a:t>Avail for Windows 7 SP1 &amp; 2008 R2 SP1 via Microsoft Downloads</a:t>
             </a:r>
           </a:p>
@@ -6157,7 +6113,7 @@
               <a:buChar char="•"/>
             </a:pPr>
             <a:r>
-              <a:rPr lang="en-GB" sz="2800" dirty="0" smtClean="0"/>
+              <a:rPr lang="en-GB" sz="2800" dirty="0"/>
               <a:t>Implicit Module Loading, Workflows, Updatable Help, ISE IntelliSense &amp; snippets introduced</a:t>
             </a:r>
           </a:p>
@@ -6193,7 +6149,7 @@
           <a:lstStyle/>
           <a:p>
             <a:r>
-              <a:rPr lang="en-GB" sz="2800" dirty="0" smtClean="0"/>
+              <a:rPr lang="en-GB" sz="2800" dirty="0"/>
               <a:t>Cons</a:t>
             </a:r>
           </a:p>
@@ -6203,15 +6159,15 @@
               <a:buChar char="•"/>
             </a:pPr>
             <a:r>
-              <a:rPr lang="en-GB" sz="2800" dirty="0" smtClean="0"/>
+              <a:rPr lang="en-GB" sz="2800" dirty="0"/>
               <a:t>Built for </a:t>
             </a:r>
             <a:r>
-              <a:rPr lang="en-GB" sz="2800" dirty="0" err="1" smtClean="0"/>
+              <a:rPr lang="en-GB" sz="2800" dirty="0" err="1"/>
               <a:t>.Net</a:t>
             </a:r>
             <a:r>
-              <a:rPr lang="en-GB" sz="2800" dirty="0" smtClean="0"/>
+              <a:rPr lang="en-GB" sz="2800" dirty="0"/>
               <a:t> v4 which broke some applications like SharePoint that required v2 </a:t>
             </a:r>
           </a:p>
@@ -6221,7 +6177,7 @@
               <a:buChar char="•"/>
             </a:pPr>
             <a:r>
-              <a:rPr lang="en-GB" sz="2800" dirty="0" smtClean="0"/>
+              <a:rPr lang="en-GB" sz="2800" dirty="0"/>
               <a:t>Best practises still not really defined but getting closer (thanks to community)</a:t>
             </a:r>
           </a:p>
@@ -6231,15 +6187,15 @@
               <a:buChar char="•"/>
             </a:pPr>
             <a:r>
-              <a:rPr lang="en-GB" sz="2800" dirty="0" smtClean="0"/>
+              <a:rPr lang="en-GB" sz="2800" dirty="0"/>
               <a:t>Lots of things are now easier to do because of new cmdlets – less need to rely on </a:t>
             </a:r>
             <a:r>
-              <a:rPr lang="en-GB" sz="2800" dirty="0" err="1" smtClean="0"/>
+              <a:rPr lang="en-GB" sz="2800" dirty="0" err="1"/>
               <a:t>.Net</a:t>
             </a:r>
             <a:r>
-              <a:rPr lang="en-GB" sz="2800" dirty="0" smtClean="0"/>
+              <a:rPr lang="en-GB" sz="2800" dirty="0"/>
               <a:t> Methods – though still able to be used.</a:t>
             </a:r>
           </a:p>
@@ -6249,15 +6205,15 @@
               <a:buChar char="•"/>
             </a:pPr>
             <a:r>
-              <a:rPr lang="en-GB" sz="2800" dirty="0" smtClean="0"/>
+              <a:rPr lang="en-GB" sz="2800" dirty="0"/>
               <a:t>No real module sharing method – except </a:t>
             </a:r>
             <a:r>
-              <a:rPr lang="en-GB" sz="2800" dirty="0" err="1" smtClean="0"/>
+              <a:rPr lang="en-GB" sz="2800" dirty="0" err="1"/>
               <a:t>Technet</a:t>
             </a:r>
             <a:r>
-              <a:rPr lang="en-GB" sz="2800" dirty="0" smtClean="0"/>
+              <a:rPr lang="en-GB" sz="2800" dirty="0"/>
               <a:t> Script Gallery</a:t>
             </a:r>
           </a:p>
@@ -6266,7 +6222,7 @@
               <a:buFont typeface="Arial" panose="020B0604020202020204" pitchFamily="34" charset="0"/>
               <a:buChar char="•"/>
             </a:pPr>
-            <a:endParaRPr lang="en-GB" sz="2800" dirty="0" smtClean="0"/>
+            <a:endParaRPr lang="en-GB" sz="2800" dirty="0"/>
           </a:p>
         </p:txBody>
       </p:sp>
@@ -6280,13 +6236,6 @@
   <p:clrMapOvr>
     <a:masterClrMapping/>
   </p:clrMapOvr>
-  <p:timing>
-    <p:tnLst>
-      <p:par>
-        <p:cTn id="1" dur="indefinite" restart="never" nodeType="tmRoot"/>
-      </p:par>
-    </p:tnLst>
-  </p:timing>
 </p:sld>
 </file>
 
@@ -6376,14 +6325,9 @@
           <a:lstStyle/>
           <a:p>
             <a:r>
-              <a:rPr lang="en-GB" dirty="0" smtClean="0"/>
-              <a:t>v4</a:t>
-            </a:r>
-            <a:r>
-              <a:rPr lang="en-GB" dirty="0" smtClean="0"/>
-              <a:t> – A real v3 - 2013</a:t>
-            </a:r>
-            <a:endParaRPr lang="en-GB" dirty="0"/>
+              <a:rPr lang="en-GB" dirty="0"/>
+              <a:t>v4 – A real v3 - 2013</a:t>
+            </a:r>
           </a:p>
         </p:txBody>
       </p:sp>
@@ -6410,7 +6354,7 @@
           <a:lstStyle/>
           <a:p>
             <a:r>
-              <a:rPr lang="en-GB" sz="2800" dirty="0" smtClean="0"/>
+              <a:rPr lang="en-GB" sz="2800" dirty="0"/>
               <a:t>Pros</a:t>
             </a:r>
           </a:p>
@@ -6420,7 +6364,7 @@
               <a:buChar char="•"/>
             </a:pPr>
             <a:r>
-              <a:rPr lang="en-GB" sz="2800" dirty="0" smtClean="0"/>
+              <a:rPr lang="en-GB" sz="2800" dirty="0"/>
               <a:t>Bundled as part of WMF 4.0</a:t>
             </a:r>
           </a:p>
@@ -6430,7 +6374,7 @@
               <a:buChar char="•"/>
             </a:pPr>
             <a:r>
-              <a:rPr lang="en-GB" sz="2800" dirty="0" smtClean="0"/>
+              <a:rPr lang="en-GB" sz="2800" dirty="0"/>
               <a:t>Part of Windows 8.1 &amp; Server 2012 R2</a:t>
             </a:r>
           </a:p>
@@ -6440,7 +6384,7 @@
               <a:buChar char="•"/>
             </a:pPr>
             <a:r>
-              <a:rPr lang="en-GB" sz="2800" dirty="0" smtClean="0"/>
+              <a:rPr lang="en-GB" sz="2800" dirty="0"/>
               <a:t>Avail for Windows 7 SP1 &amp; 2008 R2 SP1 &amp; 2012 via Microsoft Downloads</a:t>
             </a:r>
           </a:p>
@@ -6450,15 +6394,15 @@
               <a:buChar char="•"/>
             </a:pPr>
             <a:r>
-              <a:rPr lang="en-GB" sz="2800" dirty="0" smtClean="0"/>
+              <a:rPr lang="en-GB" sz="2800" dirty="0"/>
               <a:t>Where &amp; </a:t>
             </a:r>
             <a:r>
-              <a:rPr lang="en-GB" sz="2800" dirty="0" err="1" smtClean="0"/>
+              <a:rPr lang="en-GB" sz="2800" dirty="0" err="1"/>
               <a:t>ForEach</a:t>
             </a:r>
             <a:r>
-              <a:rPr lang="en-GB" sz="2800" dirty="0" smtClean="0"/>
+              <a:rPr lang="en-GB" sz="2800" dirty="0"/>
               <a:t> methods, Desired State Configuration v1 &amp; Save-Help introduced</a:t>
             </a:r>
           </a:p>
@@ -6494,7 +6438,7 @@
           <a:lstStyle/>
           <a:p>
             <a:r>
-              <a:rPr lang="en-GB" sz="2800" dirty="0" smtClean="0"/>
+              <a:rPr lang="en-GB" sz="2800" dirty="0"/>
               <a:t>Cons</a:t>
             </a:r>
           </a:p>
@@ -6504,7 +6448,7 @@
               <a:buChar char="•"/>
             </a:pPr>
             <a:r>
-              <a:rPr lang="en-GB" sz="2800" dirty="0" smtClean="0"/>
+              <a:rPr lang="en-GB" sz="2800" dirty="0"/>
               <a:t>Best practises still not really defined but getting closer (thanks to community)</a:t>
             </a:r>
           </a:p>
@@ -6514,7 +6458,7 @@
               <a:buChar char="•"/>
             </a:pPr>
             <a:r>
-              <a:rPr lang="en-GB" sz="2800" dirty="0" smtClean="0"/>
+              <a:rPr lang="en-GB" sz="2800" dirty="0"/>
               <a:t>DSC replaces a lot of possible custom scripts that were built to do similar tasks</a:t>
             </a:r>
           </a:p>
@@ -6524,7 +6468,7 @@
               <a:buChar char="•"/>
             </a:pPr>
             <a:r>
-              <a:rPr lang="en-GB" sz="2800" dirty="0" smtClean="0"/>
+              <a:rPr lang="en-GB" sz="2800" dirty="0"/>
               <a:t>Now makes it more difficult to continue  write scripts with v2 Support</a:t>
             </a:r>
           </a:p>
@@ -6534,15 +6478,15 @@
               <a:buChar char="•"/>
             </a:pPr>
             <a:r>
-              <a:rPr lang="en-GB" sz="2800" dirty="0" smtClean="0"/>
+              <a:rPr lang="en-GB" sz="2800" dirty="0"/>
               <a:t>Although on newer OS’s and down </a:t>
             </a:r>
             <a:r>
-              <a:rPr lang="en-GB" sz="2800" dirty="0" err="1" smtClean="0"/>
+              <a:rPr lang="en-GB" sz="2800" dirty="0" err="1"/>
               <a:t>Compat</a:t>
             </a:r>
             <a:r>
-              <a:rPr lang="en-GB" sz="2800" dirty="0" smtClean="0"/>
+              <a:rPr lang="en-GB" sz="2800" dirty="0"/>
               <a:t> – v2 /v3 still predominant on Servers</a:t>
             </a:r>
           </a:p>
@@ -6552,7 +6496,7 @@
               <a:buChar char="•"/>
             </a:pPr>
             <a:r>
-              <a:rPr lang="en-GB" sz="2800" dirty="0" smtClean="0"/>
+              <a:rPr lang="en-GB" sz="2800" dirty="0"/>
               <a:t>DSC still really a v0.7 release</a:t>
             </a:r>
           </a:p>
@@ -6568,13 +6512,6 @@
   <p:clrMapOvr>
     <a:masterClrMapping/>
   </p:clrMapOvr>
-  <p:timing>
-    <p:tnLst>
-      <p:par>
-        <p:cTn id="1" dur="indefinite" restart="never" nodeType="tmRoot"/>
-      </p:par>
-    </p:tnLst>
-  </p:timing>
 </p:sld>
 </file>
 
@@ -6664,14 +6601,9 @@
           <a:lstStyle/>
           <a:p>
             <a:r>
-              <a:rPr lang="en-GB" dirty="0" smtClean="0"/>
-              <a:t>v5</a:t>
-            </a:r>
-            <a:r>
-              <a:rPr lang="en-GB" dirty="0" smtClean="0"/>
-              <a:t> – A real v4 - 2014</a:t>
-            </a:r>
-            <a:endParaRPr lang="en-GB" dirty="0"/>
+              <a:rPr lang="en-GB" dirty="0"/>
+              <a:t>v5 – A real v4 - 2014</a:t>
+            </a:r>
           </a:p>
         </p:txBody>
       </p:sp>
@@ -6698,7 +6630,7 @@
           <a:lstStyle/>
           <a:p>
             <a:r>
-              <a:rPr lang="en-GB" sz="2800" dirty="0" smtClean="0"/>
+              <a:rPr lang="en-GB" sz="2800" dirty="0"/>
               <a:t>Pros</a:t>
             </a:r>
           </a:p>
@@ -6708,7 +6640,7 @@
               <a:buChar char="•"/>
             </a:pPr>
             <a:r>
-              <a:rPr lang="en-GB" sz="2800" dirty="0" smtClean="0"/>
+              <a:rPr lang="en-GB" sz="2800" dirty="0"/>
               <a:t>Bundled as part of WMF 5.0 &amp; Windows 10 &amp; Server 2016 TP</a:t>
             </a:r>
           </a:p>
@@ -6718,7 +6650,7 @@
               <a:buChar char="•"/>
             </a:pPr>
             <a:r>
-              <a:rPr lang="en-GB" sz="2800" dirty="0" smtClean="0"/>
+              <a:rPr lang="en-GB" sz="2800" dirty="0"/>
               <a:t>Avail for Windows 7 SP1 &amp; 2008 R2 SP1 &amp; 2012 via Microsoft Downloads</a:t>
             </a:r>
           </a:p>
@@ -6728,30 +6660,25 @@
               <a:buChar char="•"/>
             </a:pPr>
             <a:r>
-              <a:rPr lang="en-GB" sz="2800" dirty="0" smtClean="0"/>
+              <a:rPr lang="en-GB" sz="2800" dirty="0"/>
               <a:t>Pester, </a:t>
             </a:r>
             <a:r>
-              <a:rPr lang="en-GB" sz="2800" dirty="0" err="1" smtClean="0"/>
+              <a:rPr lang="en-GB" sz="2800" dirty="0" err="1"/>
               <a:t>PSReadline</a:t>
             </a:r>
             <a:r>
               <a:rPr lang="en-GB" sz="2800" dirty="0"/>
-              <a:t> </a:t>
-            </a:r>
-            <a:r>
-              <a:rPr lang="en-GB" sz="2800" dirty="0" smtClean="0"/>
-              <a:t>both OS baked in, Classes, PowerShell Gallery using </a:t>
-            </a:r>
-            <a:r>
-              <a:rPr lang="en-GB" sz="2800" dirty="0" err="1" smtClean="0"/>
+              <a:t> both OS baked in, Classes, PowerShell Gallery using </a:t>
+            </a:r>
+            <a:r>
+              <a:rPr lang="en-GB" sz="2800" dirty="0" err="1"/>
               <a:t>PSGet</a:t>
             </a:r>
             <a:r>
-              <a:rPr lang="en-GB" sz="2800" dirty="0" smtClean="0"/>
+              <a:rPr lang="en-GB" sz="2800" dirty="0"/>
               <a:t> (again OS) DSC v2 with partial configurations</a:t>
             </a:r>
-            <a:endParaRPr lang="en-GB" sz="2800" dirty="0"/>
           </a:p>
         </p:txBody>
       </p:sp>
@@ -6778,7 +6705,7 @@
           <a:lstStyle/>
           <a:p>
             <a:r>
-              <a:rPr lang="en-GB" sz="2800" dirty="0" smtClean="0"/>
+              <a:rPr lang="en-GB" sz="2800" dirty="0"/>
               <a:t>Cons</a:t>
             </a:r>
           </a:p>
@@ -6788,7 +6715,7 @@
               <a:buChar char="•"/>
             </a:pPr>
             <a:r>
-              <a:rPr lang="en-GB" sz="2800" dirty="0" smtClean="0"/>
+              <a:rPr lang="en-GB" sz="2800" dirty="0"/>
               <a:t>Best practises are still being defined – now on GitHub</a:t>
             </a:r>
           </a:p>
@@ -6798,10 +6725,9 @@
               <a:buChar char="•"/>
             </a:pPr>
             <a:r>
-              <a:rPr lang="en-GB" sz="2800" dirty="0" smtClean="0"/>
+              <a:rPr lang="en-GB" sz="2800" dirty="0"/>
               <a:t>Cons from v4 still applicable</a:t>
             </a:r>
-            <a:endParaRPr lang="en-GB" sz="2800" dirty="0"/>
           </a:p>
           <a:p>
             <a:pPr marL="457200" indent="-457200">
@@ -6809,7 +6735,7 @@
               <a:buChar char="•"/>
             </a:pPr>
             <a:r>
-              <a:rPr lang="en-GB" sz="2800" dirty="0" smtClean="0"/>
+              <a:rPr lang="en-GB" sz="2800" dirty="0"/>
               <a:t>Not fully released (Production Preview is the term being used)</a:t>
             </a:r>
           </a:p>
@@ -6819,7 +6745,7 @@
               <a:buChar char="•"/>
             </a:pPr>
             <a:r>
-              <a:rPr lang="en-GB" sz="2800" dirty="0" smtClean="0"/>
+              <a:rPr lang="en-GB" sz="2800" dirty="0"/>
               <a:t>Still being expanded via Windows Updates for Windows 10</a:t>
             </a:r>
           </a:p>
@@ -6835,13 +6761,6 @@
   <p:clrMapOvr>
     <a:masterClrMapping/>
   </p:clrMapOvr>
-  <p:timing>
-    <p:tnLst>
-      <p:par>
-        <p:cTn id="1" dur="indefinite" restart="never" nodeType="tmRoot"/>
-      </p:par>
-    </p:tnLst>
-  </p:timing>
 </p:sld>
 </file>
 
@@ -6931,10 +6850,9 @@
           <a:lstStyle/>
           <a:p>
             <a:r>
-              <a:rPr lang="en-GB" dirty="0" smtClean="0"/>
+              <a:rPr lang="en-GB" dirty="0"/>
               <a:t>Info Overload!!</a:t>
             </a:r>
-            <a:endParaRPr lang="en-GB" dirty="0"/>
           </a:p>
         </p:txBody>
       </p:sp>
@@ -6961,7 +6879,7 @@
           <a:lstStyle/>
           <a:p>
             <a:r>
-              <a:rPr lang="en-GB" sz="3200" dirty="0" smtClean="0"/>
+              <a:rPr lang="en-GB" sz="3200" dirty="0"/>
               <a:t>But this is just the Tip of the Iceberg so to speak and we haven’t even really touched on the things that make PowerShell Powerful and the language to learn in 2016</a:t>
             </a:r>
           </a:p>
@@ -6980,13 +6898,6 @@
   <p:clrMapOvr>
     <a:masterClrMapping/>
   </p:clrMapOvr>
-  <p:timing>
-    <p:tnLst>
-      <p:par>
-        <p:cTn id="1" dur="indefinite" restart="never" nodeType="tmRoot"/>
-      </p:par>
-    </p:tnLst>
-  </p:timing>
 </p:sld>
 </file>
 
@@ -7079,10 +6990,9 @@
           <a:lstStyle/>
           <a:p>
             <a:r>
-              <a:rPr lang="en-GB" dirty="0" smtClean="0"/>
+              <a:rPr lang="en-GB" dirty="0"/>
               <a:t>Some of the things I use PowerShell for include</a:t>
             </a:r>
-            <a:endParaRPr lang="en-GB" dirty="0"/>
           </a:p>
         </p:txBody>
       </p:sp>
@@ -7113,7 +7023,7 @@
               <a:buChar char="•"/>
             </a:pPr>
             <a:r>
-              <a:rPr lang="en-GB" sz="2800" dirty="0" smtClean="0"/>
+              <a:rPr lang="en-GB" sz="2800" dirty="0"/>
               <a:t>Administration for this User Group – Using Eventbrite API’s and Exchange Online Capabilities</a:t>
             </a:r>
           </a:p>
@@ -7123,7 +7033,7 @@
               <a:buChar char="•"/>
             </a:pPr>
             <a:r>
-              <a:rPr lang="en-GB" sz="2800" dirty="0" smtClean="0"/>
+              <a:rPr lang="en-GB" sz="2800" dirty="0"/>
               <a:t>Automatic Tweeting from list items in a SharePoint List (WIP)</a:t>
             </a:r>
           </a:p>
@@ -7133,7 +7043,7 @@
               <a:buChar char="•"/>
             </a:pPr>
             <a:r>
-              <a:rPr lang="en-GB" sz="2800" dirty="0" smtClean="0"/>
+              <a:rPr lang="en-GB" sz="2800" dirty="0"/>
               <a:t>Automatic Email sending to Speakers for PowerShell Conference EU</a:t>
             </a:r>
           </a:p>
@@ -7143,7 +7053,7 @@
               <a:buChar char="•"/>
             </a:pPr>
             <a:r>
-              <a:rPr lang="en-GB" sz="2800" dirty="0" smtClean="0"/>
+              <a:rPr lang="en-GB" sz="2800" dirty="0"/>
               <a:t>Auto Git Commit my PowerShell Scripts (because you use Source Control right?)</a:t>
             </a:r>
           </a:p>
@@ -7153,7 +7063,7 @@
               <a:buChar char="•"/>
             </a:pPr>
             <a:r>
-              <a:rPr lang="en-GB" sz="2800" dirty="0" smtClean="0"/>
+              <a:rPr lang="en-GB" sz="2800" dirty="0"/>
               <a:t>Auto making new Exchange Folders and Inbox rules based on GitHub Repo’s that I’m following</a:t>
             </a:r>
           </a:p>
@@ -7163,7 +7073,7 @@
               <a:buChar char="•"/>
             </a:pPr>
             <a:r>
-              <a:rPr lang="en-GB" sz="2800" dirty="0" smtClean="0"/>
+              <a:rPr lang="en-GB" sz="2800" dirty="0"/>
               <a:t>Auto Create Users in AD based on SharePoint List items</a:t>
             </a:r>
           </a:p>
@@ -7176,7 +7086,7 @@
           </a:p>
           <a:p>
             <a:r>
-              <a:rPr lang="en-GB" sz="2800" dirty="0" smtClean="0"/>
+              <a:rPr lang="en-GB" sz="2800" dirty="0"/>
               <a:t>And many More too!</a:t>
             </a:r>
           </a:p>
@@ -7192,13 +7102,6 @@
   <p:clrMapOvr>
     <a:masterClrMapping/>
   </p:clrMapOvr>
-  <p:timing>
-    <p:tnLst>
-      <p:par>
-        <p:cTn id="1" dur="indefinite" restart="never" nodeType="tmRoot"/>
-      </p:par>
-    </p:tnLst>
-  </p:timing>
 </p:sld>
 </file>
 
@@ -7288,10 +7191,9 @@
           <a:lstStyle/>
           <a:p>
             <a:r>
-              <a:rPr lang="en-GB" dirty="0" smtClean="0"/>
+              <a:rPr lang="en-GB" dirty="0"/>
               <a:t>Any Questions??</a:t>
             </a:r>
-            <a:endParaRPr lang="en-GB" dirty="0"/>
           </a:p>
         </p:txBody>
       </p:sp>
@@ -7305,13 +7207,6 @@
   <p:clrMapOvr>
     <a:masterClrMapping/>
   </p:clrMapOvr>
-  <p:timing>
-    <p:tnLst>
-      <p:par>
-        <p:cTn id="1" dur="indefinite" restart="never" nodeType="tmRoot"/>
-      </p:par>
-    </p:tnLst>
-  </p:timing>
 </p:sld>
 </file>
 
@@ -7401,10 +7296,9 @@
           <a:lstStyle/>
           <a:p>
             <a:r>
-              <a:rPr lang="en-GB" dirty="0" smtClean="0"/>
+              <a:rPr lang="en-GB" dirty="0"/>
               <a:t>Further Details</a:t>
             </a:r>
-            <a:endParaRPr lang="en-GB" dirty="0"/>
           </a:p>
         </p:txBody>
       </p:sp>
@@ -7431,55 +7325,45 @@
           <a:lstStyle/>
           <a:p>
             <a:r>
-              <a:rPr lang="en-GB" sz="2400" dirty="0" smtClean="0"/>
+              <a:rPr lang="en-GB" sz="2400" dirty="0"/>
               <a:t>Twitter - @ryanyates1990</a:t>
             </a:r>
           </a:p>
           <a:p>
-            <a:endParaRPr lang="en-GB" sz="2400" dirty="0" smtClean="0"/>
-          </a:p>
-          <a:p>
-            <a:r>
-              <a:rPr lang="en-GB" sz="2400" dirty="0" smtClean="0"/>
-              <a:t>LinkedIn </a:t>
-            </a:r>
+            <a:endParaRPr lang="en-GB" sz="2400" dirty="0"/>
+          </a:p>
+          <a:p>
             <a:r>
               <a:rPr lang="en-GB" sz="2400" dirty="0"/>
-              <a:t>- </a:t>
+              <a:t>LinkedIn - </a:t>
             </a:r>
             <a:r>
               <a:rPr lang="en-GB" sz="2400" dirty="0">
                 <a:hlinkClick r:id="rId2"/>
               </a:rPr>
-              <a:t>http://</a:t>
-            </a:r>
-            <a:r>
-              <a:rPr lang="en-GB" sz="2400" dirty="0" smtClean="0">
-                <a:hlinkClick r:id="rId2"/>
-              </a:rPr>
-              <a:t>uk.linkedin.com/in/ryanyates90</a:t>
-            </a:r>
-            <a:r>
-              <a:rPr lang="en-GB" sz="2400" dirty="0" smtClean="0"/>
+              <a:t>http://uk.linkedin.com/in/ryanyates90</a:t>
+            </a:r>
+            <a:r>
+              <a:rPr lang="en-GB" sz="2400" dirty="0"/>
               <a:t> </a:t>
             </a:r>
           </a:p>
           <a:p>
-            <a:endParaRPr lang="en-GB" sz="2400" dirty="0" smtClean="0"/>
-          </a:p>
-          <a:p>
-            <a:r>
-              <a:rPr lang="en-GB" sz="2400" dirty="0" smtClean="0"/>
+            <a:endParaRPr lang="en-GB" sz="2400" dirty="0"/>
+          </a:p>
+          <a:p>
+            <a:r>
+              <a:rPr lang="en-GB" sz="2400" dirty="0"/>
               <a:t>Blog – </a:t>
             </a:r>
             <a:r>
-              <a:rPr lang="en-GB" sz="2400" dirty="0" smtClean="0">
+              <a:rPr lang="en-GB" sz="2400" dirty="0">
                 <a:hlinkClick r:id="rId3"/>
               </a:rPr>
               <a:t>www.kilasuit.org/blog</a:t>
             </a:r>
             <a:r>
-              <a:rPr lang="en-GB" sz="2400" dirty="0" smtClean="0"/>
+              <a:rPr lang="en-GB" sz="2400" dirty="0"/>
               <a:t> </a:t>
             </a:r>
           </a:p>
@@ -7488,16 +7372,16 @@
           </a:p>
           <a:p>
             <a:r>
-              <a:rPr lang="en-GB" sz="2400" dirty="0" smtClean="0"/>
+              <a:rPr lang="en-GB" sz="2400" dirty="0"/>
               <a:t>Email/Lync – </a:t>
             </a:r>
             <a:r>
-              <a:rPr lang="en-GB" sz="2400" dirty="0" smtClean="0">
+              <a:rPr lang="en-GB" sz="2400" dirty="0">
                 <a:hlinkClick r:id="rId4"/>
               </a:rPr>
               <a:t>ryan.yates@kilasuit.org</a:t>
             </a:r>
-            <a:endParaRPr lang="en-GB" sz="2400" dirty="0" smtClean="0"/>
+            <a:endParaRPr lang="en-GB" sz="2400" dirty="0"/>
           </a:p>
           <a:p>
             <a:endParaRPr lang="en-GB" sz="2400" dirty="0"/>
@@ -7514,13 +7398,6 @@
   <p:clrMapOvr>
     <a:masterClrMapping/>
   </p:clrMapOvr>
-  <p:timing>
-    <p:tnLst>
-      <p:par>
-        <p:cTn id="1" dur="indefinite" restart="never" nodeType="tmRoot"/>
-      </p:par>
-    </p:tnLst>
-  </p:timing>
 </p:sld>
 </file>
 
@@ -7611,13 +7488,8 @@
           <a:p>
             <a:r>
               <a:rPr lang="en-GB" dirty="0"/>
-              <a:t>W</a:t>
-            </a:r>
-            <a:r>
-              <a:rPr lang="en-GB" dirty="0" smtClean="0"/>
-              <a:t>ho Am I?</a:t>
-            </a:r>
-            <a:endParaRPr lang="en-GB" dirty="0"/>
+              <a:t>Who Am I?</a:t>
+            </a:r>
           </a:p>
         </p:txBody>
       </p:sp>
@@ -7629,8 +7501,8 @@
         </p:nvSpPr>
         <p:spPr>
           <a:xfrm>
-            <a:off x="305798" y="1945496"/>
-            <a:ext cx="4851919" cy="4893647"/>
+            <a:off x="314171" y="1467420"/>
+            <a:ext cx="7899074" cy="5262979"/>
           </a:xfrm>
           <a:prstGeom prst="rect">
             <a:avLst/>
@@ -7644,73 +7516,79 @@
           <a:lstStyle/>
           <a:p>
             <a:r>
-              <a:rPr lang="en-GB" sz="2400" dirty="0" smtClean="0"/>
-              <a:t>Ryan Yates – 25 – Proud father to Aaron 6 &amp; Kyra 22 months</a:t>
-            </a:r>
-          </a:p>
-          <a:p>
-            <a:endParaRPr lang="en-GB" sz="2400" dirty="0" smtClean="0"/>
-          </a:p>
-          <a:p>
-            <a:r>
-              <a:rPr lang="en-GB" sz="2400" u="sng" dirty="0" smtClean="0"/>
+              <a:rPr lang="en-GB" sz="2400" dirty="0"/>
+              <a:t>Ryan Yates – 26 &amp; a Microsoft Cloud &amp; </a:t>
+            </a:r>
+            <a:r>
+              <a:rPr lang="en-GB" sz="2400" dirty="0" err="1"/>
+              <a:t>DataCentre</a:t>
+            </a:r>
+            <a:r>
+              <a:rPr lang="en-GB" sz="2400" dirty="0"/>
+              <a:t> Management MVP predominantly focused on Windows 10, PowerShell &amp; historically SharePoint </a:t>
+            </a:r>
+          </a:p>
+          <a:p>
+            <a:endParaRPr lang="en-GB" sz="2400" dirty="0"/>
+          </a:p>
+          <a:p>
+            <a:r>
+              <a:rPr lang="en-GB" sz="2400" dirty="0"/>
+              <a:t>Coordinator of Get-PSUGUK – The UK PowerShell User Groups and Co-Organiser of </a:t>
+            </a:r>
+            <a:r>
+              <a:rPr lang="en-GB" sz="2400" dirty="0" err="1"/>
+              <a:t>PSConfEU</a:t>
+            </a:r>
+            <a:r>
+              <a:rPr lang="en-GB" sz="2400" dirty="0"/>
+              <a:t> – the Premier PowerShell Conference of the year</a:t>
+            </a:r>
+          </a:p>
+          <a:p>
+            <a:endParaRPr lang="en-GB" sz="2400" dirty="0"/>
+          </a:p>
+          <a:p>
+            <a:r>
+              <a:rPr lang="en-GB" sz="2400" u="sng" dirty="0"/>
               <a:t>Currently</a:t>
             </a:r>
           </a:p>
           <a:p>
             <a:r>
-              <a:rPr lang="en-GB" sz="2400" dirty="0" smtClean="0"/>
+              <a:rPr lang="en-GB" sz="2400" dirty="0"/>
               <a:t>MCP – Windows XP</a:t>
             </a:r>
           </a:p>
           <a:p>
-            <a:endParaRPr lang="en-GB" sz="2400" dirty="0" smtClean="0"/>
-          </a:p>
-          <a:p>
-            <a:r>
-              <a:rPr lang="en-GB" sz="2400" u="sng" dirty="0" smtClean="0"/>
+            <a:endParaRPr lang="en-GB" sz="2400" dirty="0"/>
+          </a:p>
+          <a:p>
+            <a:r>
+              <a:rPr lang="en-GB" sz="2400" u="sng" dirty="0"/>
               <a:t>Planned</a:t>
             </a:r>
           </a:p>
           <a:p>
-            <a:r>
-              <a:rPr lang="en-GB" sz="2400" dirty="0" smtClean="0"/>
-              <a:t>MCSA Office 365</a:t>
-            </a:r>
-          </a:p>
-          <a:p>
-            <a:r>
-              <a:rPr lang="en-GB" sz="2400" dirty="0" smtClean="0"/>
-              <a:t>MCITP SharePoint 2010 &amp; MCSE SharePoint 2013 </a:t>
-            </a:r>
-          </a:p>
-          <a:p>
-            <a:r>
-              <a:rPr lang="en-GB" sz="2400" dirty="0" smtClean="0"/>
-              <a:t>MCSA Server 2008 -&gt; Server 2012</a:t>
-            </a:r>
-          </a:p>
-          <a:p>
-            <a:r>
-              <a:rPr lang="en-GB" sz="2400" dirty="0" smtClean="0"/>
-              <a:t>MCSE Private Cloud</a:t>
-            </a:r>
             <a:endParaRPr lang="en-GB" sz="2400" dirty="0"/>
           </a:p>
           <a:p>
-            <a:endParaRPr lang="en-GB" sz="2400" dirty="0"/>
+            <a:r>
+              <a:rPr lang="en-GB" sz="2400" dirty="0"/>
+              <a:t>TBD</a:t>
+            </a:r>
           </a:p>
         </p:txBody>
       </p:sp>
       <p:pic>
         <p:nvPicPr>
-          <p:cNvPr id="3" name="Picture 2"/>
+          <p:cNvPr id="5" name="Picture 4"/>
           <p:cNvPicPr>
             <a:picLocks noChangeAspect="1"/>
           </p:cNvPicPr>
           <p:nvPr/>
         </p:nvPicPr>
-        <p:blipFill rotWithShape="1">
+        <p:blipFill>
           <a:blip r:embed="rId2">
             <a:extLst>
               <a:ext uri="{28A0092B-C50C-407E-A947-70E740481C1C}">
@@ -7718,13 +7596,14 @@
               </a:ext>
             </a:extLst>
           </a:blip>
-          <a:srcRect t="20537"/>
-          <a:stretch/>
+          <a:stretch>
+            <a:fillRect/>
+          </a:stretch>
         </p:blipFill>
         <p:spPr>
           <a:xfrm>
-            <a:off x="6974810" y="1682154"/>
-            <a:ext cx="4282656" cy="4537494"/>
+            <a:off x="8527415" y="1057423"/>
+            <a:ext cx="3183891" cy="5515315"/>
           </a:xfrm>
           <a:prstGeom prst="rect">
             <a:avLst/>
@@ -7734,7 +7613,7 @@
     </p:spTree>
     <p:extLst>
       <p:ext uri="{BB962C8B-B14F-4D97-AF65-F5344CB8AC3E}">
-        <p14:creationId xmlns:p14="http://schemas.microsoft.com/office/powerpoint/2010/main" val="3221233560"/>
+        <p14:creationId xmlns:p14="http://schemas.microsoft.com/office/powerpoint/2010/main" val="4099876003"/>
       </p:ext>
     </p:extLst>
   </p:cSld>
@@ -7820,44 +7699,13 @@
                                       <p:cBhvr>
                                         <p:cTn id="10" dur="1" fill="hold">
                                           <p:stCondLst>
-                                            <p:cond delay="2749"/>
+                                            <p:cond delay="9"/>
                                           </p:stCondLst>
                                         </p:cTn>
                                         <p:tgtEl>
                                           <p:spTgt spid="7">
                                             <p:txEl>
                                               <p:pRg st="2" end="2"/>
-                                            </p:txEl>
-                                          </p:spTgt>
-                                        </p:tgtEl>
-                                        <p:attrNameLst>
-                                          <p:attrName>style.visibility</p:attrName>
-                                        </p:attrNameLst>
-                                      </p:cBhvr>
-                                      <p:to>
-                                        <p:strVal val="visible"/>
-                                      </p:to>
-                                    </p:set>
-                                  </p:childTnLst>
-                                </p:cTn>
-                              </p:par>
-                              <p:par>
-                                <p:cTn id="11" presetID="1" presetClass="entr" presetSubtype="0" fill="hold" grpId="0" nodeType="withEffect">
-                                  <p:stCondLst>
-                                    <p:cond delay="0"/>
-                                  </p:stCondLst>
-                                  <p:childTnLst>
-                                    <p:set>
-                                      <p:cBhvr>
-                                        <p:cTn id="12" dur="1" fill="hold">
-                                          <p:stCondLst>
-                                            <p:cond delay="2999"/>
-                                          </p:stCondLst>
-                                        </p:cTn>
-                                        <p:tgtEl>
-                                          <p:spTgt spid="7">
-                                            <p:txEl>
-                                              <p:pRg st="3" end="3"/>
                                             </p:txEl>
                                           </p:spTgt>
                                         </p:tgtEl>
@@ -7879,34 +7727,34 @@
                     </p:cTn>
                   </p:par>
                   <p:par>
-                    <p:cTn id="13" fill="hold">
+                    <p:cTn id="11" fill="hold">
                       <p:stCondLst>
                         <p:cond delay="indefinite"/>
                       </p:stCondLst>
                       <p:childTnLst>
                         <p:par>
-                          <p:cTn id="14" fill="hold">
+                          <p:cTn id="12" fill="hold">
                             <p:stCondLst>
                               <p:cond delay="0"/>
                             </p:stCondLst>
                             <p:childTnLst>
                               <p:par>
-                                <p:cTn id="15" presetID="1" presetClass="entr" presetSubtype="0" fill="hold" grpId="0" nodeType="clickEffect">
+                                <p:cTn id="13" presetID="1" presetClass="entr" presetSubtype="0" fill="hold" grpId="0" nodeType="clickEffect">
                                   <p:stCondLst>
                                     <p:cond delay="0"/>
                                   </p:stCondLst>
                                   <p:childTnLst>
                                     <p:set>
                                       <p:cBhvr>
-                                        <p:cTn id="16" dur="1" fill="hold">
+                                        <p:cTn id="14" dur="1" fill="hold">
                                           <p:stCondLst>
-                                            <p:cond delay="2999"/>
+                                            <p:cond delay="9"/>
                                           </p:stCondLst>
                                         </p:cTn>
                                         <p:tgtEl>
                                           <p:spTgt spid="7">
                                             <p:txEl>
-                                              <p:pRg st="5" end="5"/>
+                                              <p:pRg st="4" end="4"/>
                                             </p:txEl>
                                           </p:spTgt>
                                         </p:tgtEl>
@@ -7921,8 +7769,26 @@
                                   </p:childTnLst>
                                 </p:cTn>
                               </p:par>
+                            </p:childTnLst>
+                          </p:cTn>
+                        </p:par>
+                      </p:childTnLst>
+                    </p:cTn>
+                  </p:par>
+                  <p:par>
+                    <p:cTn id="15" fill="hold">
+                      <p:stCondLst>
+                        <p:cond delay="indefinite"/>
+                      </p:stCondLst>
+                      <p:childTnLst>
+                        <p:par>
+                          <p:cTn id="16" fill="hold">
+                            <p:stCondLst>
+                              <p:cond delay="0"/>
+                            </p:stCondLst>
+                            <p:childTnLst>
                               <p:par>
-                                <p:cTn id="17" presetID="1" presetClass="entr" presetSubtype="0" fill="hold" grpId="0" nodeType="withEffect">
+                                <p:cTn id="17" presetID="1" presetClass="entr" presetSubtype="0" fill="hold" grpId="0" nodeType="clickEffect">
                                   <p:stCondLst>
                                     <p:cond delay="0"/>
                                   </p:stCondLst>
@@ -7931,13 +7797,13 @@
                                       <p:cBhvr>
                                         <p:cTn id="18" dur="1" fill="hold">
                                           <p:stCondLst>
-                                            <p:cond delay="2999"/>
+                                            <p:cond delay="9"/>
                                           </p:stCondLst>
                                         </p:cTn>
                                         <p:tgtEl>
                                           <p:spTgt spid="7">
                                             <p:txEl>
-                                              <p:pRg st="6" end="6"/>
+                                              <p:pRg st="5" end="5"/>
                                             </p:txEl>
                                           </p:spTgt>
                                         </p:tgtEl>
@@ -7980,7 +7846,7 @@
                                       <p:cBhvr>
                                         <p:cTn id="22" dur="1" fill="hold">
                                           <p:stCondLst>
-                                            <p:cond delay="4999"/>
+                                            <p:cond delay="9"/>
                                           </p:stCondLst>
                                         </p:cTn>
                                         <p:tgtEl>
@@ -8029,56 +7895,7 @@
                                       <p:cBhvr>
                                         <p:cTn id="26" dur="1" fill="hold">
                                           <p:stCondLst>
-                                            <p:cond delay="3999"/>
-                                          </p:stCondLst>
-                                        </p:cTn>
-                                        <p:tgtEl>
-                                          <p:spTgt spid="7">
-                                            <p:txEl>
-                                              <p:pRg st="8" end="8"/>
-                                            </p:txEl>
-                                          </p:spTgt>
-                                        </p:tgtEl>
-                                        <p:attrNameLst>
-                                          <p:attrName>style.visibility</p:attrName>
-                                        </p:attrNameLst>
-                                      </p:cBhvr>
-                                      <p:to>
-                                        <p:strVal val="visible"/>
-                                      </p:to>
-                                    </p:set>
-                                  </p:childTnLst>
-                                </p:cTn>
-                              </p:par>
-                            </p:childTnLst>
-                          </p:cTn>
-                        </p:par>
-                      </p:childTnLst>
-                    </p:cTn>
-                  </p:par>
-                  <p:par>
-                    <p:cTn id="27" fill="hold">
-                      <p:stCondLst>
-                        <p:cond delay="indefinite"/>
-                      </p:stCondLst>
-                      <p:childTnLst>
-                        <p:par>
-                          <p:cTn id="28" fill="hold">
-                            <p:stCondLst>
-                              <p:cond delay="0"/>
-                            </p:stCondLst>
-                            <p:childTnLst>
-                              <p:par>
-                                <p:cTn id="29" presetID="1" presetClass="entr" presetSubtype="0" fill="hold" grpId="0" nodeType="clickEffect">
-                                  <p:stCondLst>
-                                    <p:cond delay="0"/>
-                                  </p:stCondLst>
-                                  <p:childTnLst>
-                                    <p:set>
-                                      <p:cBhvr>
-                                        <p:cTn id="30" dur="1" fill="hold">
-                                          <p:stCondLst>
-                                            <p:cond delay="4999"/>
+                                            <p:cond delay="9"/>
                                           </p:stCondLst>
                                         </p:cTn>
                                         <p:tgtEl>
@@ -8127,7 +7944,7 @@
       </p:par>
     </p:tnLst>
     <p:bldLst>
-      <p:bldP spid="7" grpId="0" build="p"/>
+      <p:bldP spid="7" grpId="0" uiExpand="1" build="p"/>
     </p:bldLst>
   </p:timing>
 </p:sld>
@@ -8219,10 +8036,9 @@
           <a:lstStyle/>
           <a:p>
             <a:r>
-              <a:rPr lang="en-GB" dirty="0" smtClean="0"/>
+              <a:rPr lang="en-GB" dirty="0"/>
               <a:t>Tweet me</a:t>
             </a:r>
-            <a:endParaRPr lang="en-GB" dirty="0"/>
           </a:p>
         </p:txBody>
       </p:sp>
@@ -8249,22 +8065,17 @@
           <a:lstStyle/>
           <a:p>
             <a:r>
-              <a:rPr lang="en-US" sz="4400" dirty="0" smtClean="0"/>
+              <a:rPr lang="en-US" sz="4400" dirty="0"/>
               <a:t>@r</a:t>
             </a:r>
             <a:r>
-              <a:rPr lang="en-US" sz="4400" kern="1200" dirty="0" smtClean="0">
+              <a:rPr lang="en-US" sz="4400" kern="1200" dirty="0">
                 <a:solidFill>
                   <a:schemeClr val="tx1"/>
                 </a:solidFill>
               </a:rPr>
               <a:t>yanyates1990</a:t>
             </a:r>
-            <a:endParaRPr lang="en-US" sz="4400" kern="1200" dirty="0">
-              <a:solidFill>
-                <a:schemeClr val="tx1"/>
-              </a:solidFill>
-            </a:endParaRPr>
           </a:p>
         </p:txBody>
       </p:sp>
@@ -8291,10 +8102,9 @@
           <a:lstStyle/>
           <a:p>
             <a:r>
-              <a:rPr lang="en-GB" sz="2800" dirty="0" smtClean="0"/>
+              <a:rPr lang="en-GB" sz="2800" dirty="0"/>
               <a:t>Any Photos or Questions about this now or in future</a:t>
             </a:r>
-            <a:endParaRPr lang="en-GB" sz="2800" dirty="0"/>
           </a:p>
         </p:txBody>
       </p:sp>
@@ -8308,13 +8118,6 @@
   <p:clrMapOvr>
     <a:masterClrMapping/>
   </p:clrMapOvr>
-  <p:timing>
-    <p:tnLst>
-      <p:par>
-        <p:cTn id="1" dur="indefinite" restart="never" nodeType="tmRoot"/>
-      </p:par>
-    </p:tnLst>
-  </p:timing>
 </p:sld>
 </file>
 
@@ -8574,38 +8377,27 @@
           </a:p>
           <a:p>
             <a:r>
-              <a:rPr lang="en-GB" dirty="0" smtClean="0"/>
-              <a:t>SharePoint </a:t>
-            </a:r>
-            <a:r>
-              <a:rPr lang="en-GB" dirty="0" smtClean="0"/>
-              <a:t>Applications/Implementation Analyst - University Of Manchester </a:t>
-            </a:r>
-            <a:endParaRPr lang="en-GB" dirty="0" smtClean="0"/>
-          </a:p>
-          <a:p>
-            <a:endParaRPr lang="en-GB" dirty="0" smtClean="0"/>
-          </a:p>
-          <a:p>
-            <a:r>
-              <a:rPr lang="en-GB" dirty="0" smtClean="0"/>
-              <a:t>SharePoint </a:t>
-            </a:r>
-            <a:r>
-              <a:rPr lang="en-GB" dirty="0" smtClean="0"/>
-              <a:t>User Support Services Engineering Consultant – Barclays </a:t>
-            </a:r>
-            <a:endParaRPr lang="en-GB" dirty="0" smtClean="0"/>
+              <a:rPr lang="en-GB" dirty="0"/>
+              <a:t>SharePoint Applications/Implementation Analyst - University Of Manchester </a:t>
+            </a:r>
           </a:p>
           <a:p>
             <a:endParaRPr lang="en-GB" dirty="0"/>
           </a:p>
           <a:p>
             <a:r>
-              <a:rPr lang="en-GB" dirty="0" smtClean="0"/>
+              <a:rPr lang="en-GB" dirty="0"/>
+              <a:t>SharePoint User Support Services Engineering Consultant – Barclays </a:t>
+            </a:r>
+          </a:p>
+          <a:p>
+            <a:endParaRPr lang="en-GB" dirty="0"/>
+          </a:p>
+          <a:p>
+            <a:r>
+              <a:rPr lang="en-GB" dirty="0"/>
               <a:t>Various Retail Jobs</a:t>
             </a:r>
-            <a:endParaRPr lang="en-GB" dirty="0"/>
           </a:p>
         </p:txBody>
       </p:sp>
@@ -8632,10 +8424,9 @@
           <a:lstStyle/>
           <a:p>
             <a:r>
-              <a:rPr lang="en-GB" dirty="0" smtClean="0"/>
+              <a:rPr lang="en-GB" dirty="0"/>
               <a:t>Professional Background</a:t>
             </a:r>
-            <a:endParaRPr lang="en-GB" dirty="0"/>
           </a:p>
         </p:txBody>
       </p:sp>
@@ -8662,7 +8453,7 @@
           <a:lstStyle/>
           <a:p>
             <a:r>
-              <a:rPr lang="en-GB" sz="2400" dirty="0" smtClean="0"/>
+              <a:rPr lang="en-GB" sz="2400" dirty="0"/>
               <a:t>Passion for all things IT related however predominantly been Microsoft Focused since Windows XP</a:t>
             </a:r>
           </a:p>
@@ -8671,7 +8462,7 @@
           </a:p>
           <a:p>
             <a:r>
-              <a:rPr lang="en-GB" sz="2400" dirty="0" smtClean="0"/>
+              <a:rPr lang="en-GB" sz="2400" dirty="0"/>
               <a:t>SharePoint was my entry into IT</a:t>
             </a:r>
           </a:p>
@@ -8680,10 +8471,9 @@
           </a:p>
           <a:p>
             <a:r>
-              <a:rPr lang="en-GB" sz="2400" dirty="0" smtClean="0"/>
+              <a:rPr lang="en-GB" sz="2400" dirty="0"/>
               <a:t>However PowerShell is my Secret love</a:t>
             </a:r>
-            <a:endParaRPr lang="en-GB" sz="2400" dirty="0"/>
           </a:p>
         </p:txBody>
       </p:sp>
@@ -8710,25 +8500,24 @@
           <a:lstStyle/>
           <a:p>
             <a:r>
-              <a:rPr lang="en-GB" dirty="0" smtClean="0"/>
+              <a:rPr lang="en-GB" dirty="0"/>
               <a:t>“Spend less time doing the same mundane tasks and spend more time pushing your knowledge in automation”</a:t>
             </a:r>
           </a:p>
           <a:p>
             <a:pPr algn="ctr"/>
             <a:r>
-              <a:rPr lang="en-GB" dirty="0" smtClean="0"/>
+              <a:rPr lang="en-GB" dirty="0"/>
               <a:t>Simple Task Automation = Early </a:t>
             </a:r>
             <a:r>
-              <a:rPr lang="en-GB" dirty="0" err="1" smtClean="0"/>
+              <a:rPr lang="en-GB" dirty="0" err="1"/>
               <a:t>DevOps</a:t>
             </a:r>
             <a:r>
-              <a:rPr lang="en-GB" dirty="0" smtClean="0"/>
+              <a:rPr lang="en-GB" dirty="0"/>
               <a:t> implementation</a:t>
             </a:r>
-            <a:endParaRPr lang="en-GB" dirty="0"/>
           </a:p>
         </p:txBody>
       </p:sp>
@@ -9152,10 +8941,9 @@
           <a:lstStyle/>
           <a:p>
             <a:r>
-              <a:rPr lang="en-GB" dirty="0" smtClean="0"/>
+              <a:rPr lang="en-GB" dirty="0"/>
               <a:t>Background to this Session</a:t>
             </a:r>
-            <a:endParaRPr lang="en-GB" dirty="0"/>
           </a:p>
         </p:txBody>
       </p:sp>
@@ -9182,25 +8970,25 @@
           <a:lstStyle/>
           <a:p>
             <a:r>
-              <a:rPr lang="en-GB" sz="2400" dirty="0" smtClean="0"/>
+              <a:rPr lang="en-GB" sz="2400" dirty="0"/>
               <a:t>So perhaps you’ve heard of PowerShell?</a:t>
             </a:r>
           </a:p>
           <a:p>
-            <a:endParaRPr lang="en-GB" sz="2400" dirty="0" smtClean="0"/>
-          </a:p>
-          <a:p>
-            <a:r>
-              <a:rPr lang="en-GB" sz="2400" dirty="0" smtClean="0"/>
+            <a:endParaRPr lang="en-GB" sz="2400" dirty="0"/>
+          </a:p>
+          <a:p>
+            <a:r>
+              <a:rPr lang="en-GB" sz="2400" dirty="0"/>
               <a:t>Perhaps you’ve used it with one of Microsoft’s Server Products like SharePoint or Exchange</a:t>
             </a:r>
           </a:p>
           <a:p>
-            <a:endParaRPr lang="en-GB" sz="2400" dirty="0" smtClean="0"/>
-          </a:p>
-          <a:p>
-            <a:r>
-              <a:rPr lang="en-GB" sz="2400" dirty="0" smtClean="0"/>
+            <a:endParaRPr lang="en-GB" sz="2400" dirty="0"/>
+          </a:p>
+          <a:p>
+            <a:r>
+              <a:rPr lang="en-GB" sz="2400" dirty="0"/>
               <a:t>But if not then I expect that you have heard of the command line</a:t>
             </a:r>
           </a:p>
@@ -9521,10 +9309,9 @@
           <a:lstStyle/>
           <a:p>
             <a:r>
-              <a:rPr lang="en-GB" dirty="0" smtClean="0"/>
+              <a:rPr lang="en-GB" dirty="0"/>
               <a:t>So what is PowerShell</a:t>
             </a:r>
-            <a:endParaRPr lang="en-GB" dirty="0"/>
           </a:p>
         </p:txBody>
       </p:sp>
@@ -9568,13 +9355,6 @@
   <p:clrMapOvr>
     <a:masterClrMapping/>
   </p:clrMapOvr>
-  <p:timing>
-    <p:tnLst>
-      <p:par>
-        <p:cTn id="1" dur="indefinite" restart="never" nodeType="tmRoot"/>
-      </p:par>
-    </p:tnLst>
-  </p:timing>
 </p:sld>
 </file>
 
@@ -9664,10 +9444,9 @@
           <a:lstStyle/>
           <a:p>
             <a:r>
-              <a:rPr lang="en-GB" dirty="0" smtClean="0"/>
+              <a:rPr lang="en-GB" dirty="0"/>
               <a:t>Kind of looks like this?</a:t>
             </a:r>
-            <a:endParaRPr lang="en-GB" dirty="0"/>
           </a:p>
         </p:txBody>
       </p:sp>
@@ -9711,13 +9490,6 @@
   <p:clrMapOvr>
     <a:masterClrMapping/>
   </p:clrMapOvr>
-  <p:timing>
-    <p:tnLst>
-      <p:par>
-        <p:cTn id="1" dur="indefinite" restart="never" nodeType="tmRoot"/>
-      </p:par>
-    </p:tnLst>
-  </p:timing>
 </p:sld>
 </file>
 
@@ -9807,10 +9579,9 @@
           <a:lstStyle/>
           <a:p>
             <a:r>
-              <a:rPr lang="en-GB" dirty="0" smtClean="0"/>
+              <a:rPr lang="en-GB" dirty="0"/>
               <a:t>So what is the difference?</a:t>
             </a:r>
-            <a:endParaRPr lang="en-GB" dirty="0"/>
           </a:p>
         </p:txBody>
       </p:sp>
@@ -9837,12 +9608,8 @@
           <a:lstStyle/>
           <a:p>
             <a:r>
-              <a:rPr lang="en-GB" sz="2400" dirty="0" smtClean="0"/>
-              <a:t>To understand this we need to cast some </a:t>
-            </a:r>
-            <a:r>
-              <a:rPr lang="en-GB" sz="2400" dirty="0" smtClean="0"/>
-              <a:t>thoughts as to how Microsoft were looking to move to in future</a:t>
+              <a:rPr lang="en-GB" sz="2400" dirty="0"/>
+              <a:t>To understand this we need to cast some thoughts as to how Microsoft were looking to move to in future</a:t>
             </a:r>
           </a:p>
           <a:p>
@@ -9850,7 +9617,7 @@
           </a:p>
           <a:p>
             <a:r>
-              <a:rPr lang="en-GB" sz="2400" dirty="0" smtClean="0"/>
+              <a:rPr lang="en-GB" sz="2400" dirty="0"/>
               <a:t>Servers and Server applications were mainly configured and maintained via GUI tools – Which although great as they get the job done they aren’t scalable. This leads to issues when a company needs to expand and quickly</a:t>
             </a:r>
           </a:p>
@@ -9869,13 +9636,6 @@
   <p:clrMapOvr>
     <a:masterClrMapping/>
   </p:clrMapOvr>
-  <p:timing>
-    <p:tnLst>
-      <p:par>
-        <p:cTn id="1" dur="indefinite" restart="never" nodeType="tmRoot"/>
-      </p:par>
-    </p:tnLst>
-  </p:timing>
 </p:sld>
 </file>
 
@@ -9965,10 +9725,9 @@
           <a:lstStyle/>
           <a:p>
             <a:r>
-              <a:rPr lang="en-GB" dirty="0" smtClean="0"/>
+              <a:rPr lang="en-GB" dirty="0"/>
               <a:t>Timeline – 2002</a:t>
             </a:r>
-            <a:endParaRPr lang="en-GB" dirty="0"/>
           </a:p>
         </p:txBody>
       </p:sp>
@@ -9999,7 +9758,7 @@
               <a:buChar char="•"/>
             </a:pPr>
             <a:r>
-              <a:rPr lang="en-GB" sz="2400" dirty="0" smtClean="0"/>
+              <a:rPr lang="en-GB" sz="2400" dirty="0"/>
               <a:t>Initially developed as Monad – or Microsoft Shell as influenced by *nix shells</a:t>
             </a:r>
           </a:p>
@@ -10016,10 +9775,9 @@
               <a:buChar char="•"/>
             </a:pPr>
             <a:r>
-              <a:rPr lang="en-GB" sz="2400" dirty="0" smtClean="0"/>
+              <a:rPr lang="en-GB" sz="2400" dirty="0"/>
               <a:t>First Draft of the Monad Manifesto was released internally at Microsoft by Jeffery Snover – this was a document that was able to be collaborated on and allowed a more diverse opinion centric model to which to evolve PowerShell into</a:t>
             </a:r>
-            <a:endParaRPr lang="en-GB" sz="2400" dirty="0"/>
           </a:p>
         </p:txBody>
       </p:sp>
@@ -10033,13 +9791,6 @@
   <p:clrMapOvr>
     <a:masterClrMapping/>
   </p:clrMapOvr>
-  <p:timing>
-    <p:tnLst>
-      <p:par>
-        <p:cTn id="1" dur="indefinite" restart="never" nodeType="tmRoot"/>
-      </p:par>
-    </p:tnLst>
-  </p:timing>
 </p:sld>
 </file>
 

</xml_diff>